<commit_message>
Implementação do metodo carrinho e melhoramento em diversos layouts
</commit_message>
<xml_diff>
--- a/Documentacao/Gestor Restaurante.pptx
+++ b/Documentacao/Gestor Restaurante.pptx
@@ -212,7 +212,7 @@
           <a:p>
             <a:fld id="{B8CA451F-3F6E-4DFB-8391-7AA6D726B747}" type="datetimeFigureOut">
               <a:rPr lang="pt-PT" smtClean="0"/>
-              <a:t>20/01/2021</a:t>
+              <a:t>21/01/2021</a:t>
             </a:fld>
             <a:endParaRPr lang="pt-PT"/>
           </a:p>
@@ -1690,7 +1690,7 @@
           <a:p>
             <a:fld id="{3BFBD6D2-8034-45F5-95FE-71C76E798512}" type="datetime1">
               <a:rPr lang="en-US" smtClean="0"/>
-              <a:t>20-Jan-21</a:t>
+              <a:t>1/21/2021</a:t>
             </a:fld>
             <a:endParaRPr lang="en-US" dirty="0"/>
           </a:p>
@@ -1924,7 +1924,7 @@
           <a:p>
             <a:fld id="{B70EBEF6-DA40-4662-AC8E-E8C21328E022}" type="datetime1">
               <a:rPr lang="en-US" smtClean="0"/>
-              <a:t>20-Jan-21</a:t>
+              <a:t>1/21/2021</a:t>
             </a:fld>
             <a:endParaRPr lang="en-US" dirty="0"/>
           </a:p>
@@ -2099,7 +2099,7 @@
           <a:p>
             <a:fld id="{BDB6DBDA-1F8E-46CF-89C0-8B0C7130355F}" type="datetime1">
               <a:rPr lang="en-US" smtClean="0"/>
-              <a:t>20-Jan-21</a:t>
+              <a:t>1/21/2021</a:t>
             </a:fld>
             <a:endParaRPr lang="en-US" dirty="0"/>
           </a:p>
@@ -2264,7 +2264,7 @@
           <a:p>
             <a:fld id="{BB63AF9F-D115-458F-A19D-749B59438F6E}" type="datetime1">
               <a:rPr lang="en-US" smtClean="0"/>
-              <a:t>20-Jan-21</a:t>
+              <a:t>1/21/2021</a:t>
             </a:fld>
             <a:endParaRPr lang="en-US" dirty="0"/>
           </a:p>
@@ -2535,7 +2535,7 @@
           <a:p>
             <a:fld id="{DEDA2878-55D1-4289-9664-0A55CE6F784B}" type="datetime1">
               <a:rPr lang="en-US" smtClean="0"/>
-              <a:t>20-Jan-21</a:t>
+              <a:t>1/21/2021</a:t>
             </a:fld>
             <a:endParaRPr lang="en-US" dirty="0"/>
           </a:p>
@@ -3732,7 +3732,7 @@
           <a:p>
             <a:fld id="{63041D4F-7AC4-4977-8E8F-3B268D35311E}" type="datetime1">
               <a:rPr lang="en-US" smtClean="0"/>
-              <a:t>20-Jan-21</a:t>
+              <a:t>1/21/2021</a:t>
             </a:fld>
             <a:endParaRPr lang="en-US" dirty="0"/>
           </a:p>
@@ -4117,7 +4117,7 @@
           <a:p>
             <a:fld id="{B26F9A7D-5AB5-4B5E-9502-0C45821CF6D9}" type="datetime1">
               <a:rPr lang="en-US" smtClean="0"/>
-              <a:t>20-Jan-21</a:t>
+              <a:t>1/21/2021</a:t>
             </a:fld>
             <a:endParaRPr lang="en-US" dirty="0"/>
           </a:p>
@@ -4235,7 +4235,7 @@
           <a:p>
             <a:fld id="{001DF333-46F2-44A3-AB73-E679D0A91A29}" type="datetime1">
               <a:rPr lang="en-US" smtClean="0"/>
-              <a:t>20-Jan-21</a:t>
+              <a:t>1/21/2021</a:t>
             </a:fld>
             <a:endParaRPr lang="en-US" dirty="0"/>
           </a:p>
@@ -4325,7 +4325,7 @@
           <a:p>
             <a:fld id="{03D2EBE6-F9DB-4BCC-9146-E94E307D78CC}" type="datetime1">
               <a:rPr lang="en-US" smtClean="0"/>
-              <a:t>20-Jan-21</a:t>
+              <a:t>1/21/2021</a:t>
             </a:fld>
             <a:endParaRPr lang="en-US" dirty="0"/>
           </a:p>
@@ -5083,7 +5083,7 @@
           <a:p>
             <a:fld id="{5BA6BA5A-F091-4FAE-B627-59A3CCDA4407}" type="datetime1">
               <a:rPr lang="en-US" smtClean="0"/>
-              <a:t>20-Jan-21</a:t>
+              <a:t>1/21/2021</a:t>
             </a:fld>
             <a:endParaRPr lang="en-US" dirty="0"/>
           </a:p>
@@ -5918,7 +5918,7 @@
           <a:p>
             <a:fld id="{9CA5862A-8A16-4342-B181-F1114AC742E0}" type="datetime1">
               <a:rPr lang="en-US" smtClean="0"/>
-              <a:t>20-Jan-21</a:t>
+              <a:t>1/21/2021</a:t>
             </a:fld>
             <a:endParaRPr lang="en-US" dirty="0"/>
           </a:p>
@@ -6140,7 +6140,7 @@
           <a:p>
             <a:fld id="{628DF38F-42B5-4D4D-84DD-715C054A5D2D}" type="datetime1">
               <a:rPr lang="en-US" smtClean="0"/>
-              <a:t>20-Jan-21</a:t>
+              <a:t>1/21/2021</a:t>
             </a:fld>
             <a:endParaRPr lang="en-US" dirty="0"/>
           </a:p>
@@ -14022,13 +14022,8 @@
             </a:pPr>
             <a:r>
               <a:rPr lang="en-US" sz="2800" cap="none" spc="0" dirty="0"/>
-              <a:t>Criar um </a:t>
+              <a:t>Criar um pedido</a:t>
             </a:r>
-            <a:r>
-              <a:rPr lang="en-US" sz="2800" cap="none" spc="0" dirty="0" err="1"/>
-              <a:t>pedido</a:t>
-            </a:r>
-            <a:endParaRPr lang="en-US" sz="2800" cap="none" spc="0" dirty="0"/>
           </a:p>
         </p:txBody>
       </p:sp>
@@ -15702,12 +15697,8 @@
           <a:p>
             <a:pPr algn="ctr"/>
             <a:r>
-              <a:rPr lang="en-US" sz="7200" spc="800" dirty="0" err="1"/>
-              <a:t>Produtos</a:t>
-            </a:r>
-            <a:r>
               <a:rPr lang="en-US" sz="7200" spc="800" dirty="0"/>
-              <a:t>  Pedidos</a:t>
+              <a:t>Produtos  Pedidos</a:t>
             </a:r>
           </a:p>
         </p:txBody>
@@ -16300,28 +16291,8 @@
               <a:buChar char="•"/>
             </a:pPr>
             <a:r>
-              <a:rPr lang="en-US" sz="2800" cap="none" spc="0" dirty="0" err="1"/>
-              <a:t>Adicionar</a:t>
-            </a:r>
-            <a:r>
               <a:rPr lang="en-US" sz="2800" cap="none" spc="0" dirty="0"/>
-              <a:t> </a:t>
-            </a:r>
-            <a:r>
-              <a:rPr lang="en-US" sz="2800" cap="none" spc="0" dirty="0" err="1"/>
-              <a:t>ao</a:t>
-            </a:r>
-            <a:r>
-              <a:rPr lang="en-US" sz="2800" cap="none" spc="0" dirty="0"/>
-              <a:t> </a:t>
-            </a:r>
-            <a:r>
-              <a:rPr lang="en-US" sz="2800" cap="none" spc="0" dirty="0" err="1"/>
-              <a:t>pedido</a:t>
-            </a:r>
-            <a:r>
-              <a:rPr lang="en-US" sz="2800" cap="none" spc="0" dirty="0"/>
-              <a:t> um </a:t>
+              <a:t>Adicionar ao pedido um </a:t>
             </a:r>
             <a:r>
               <a:rPr lang="en-US" sz="2800" cap="none" spc="0" dirty="0" err="1"/>
@@ -20704,58 +20675,6 @@
       </p:sp>
       <p:sp>
         <p:nvSpPr>
-          <p:cNvPr id="11" name="Retângulo: Cantos Arredondados 10">
-            <a:extLst>
-              <a:ext uri="{FF2B5EF4-FFF2-40B4-BE49-F238E27FC236}">
-                <a16:creationId xmlns:a16="http://schemas.microsoft.com/office/drawing/2014/main" id="{3FC25D0E-0087-46C6-84F3-0BEC45A4D4ED}"/>
-              </a:ext>
-            </a:extLst>
-          </p:cNvPr>
-          <p:cNvSpPr/>
-          <p:nvPr/>
-        </p:nvSpPr>
-        <p:spPr>
-          <a:xfrm>
-            <a:off x="1427690" y="4176917"/>
-            <a:ext cx="1713390" cy="752383"/>
-          </a:xfrm>
-          <a:prstGeom prst="roundRect">
-            <a:avLst/>
-          </a:prstGeom>
-          <a:solidFill>
-            <a:srgbClr val="00B0F0"/>
-          </a:solidFill>
-        </p:spPr>
-        <p:style>
-          <a:lnRef idx="2">
-            <a:schemeClr val="accent1">
-              <a:shade val="50000"/>
-            </a:schemeClr>
-          </a:lnRef>
-          <a:fillRef idx="1">
-            <a:schemeClr val="accent1"/>
-          </a:fillRef>
-          <a:effectRef idx="0">
-            <a:schemeClr val="accent1"/>
-          </a:effectRef>
-          <a:fontRef idx="minor">
-            <a:schemeClr val="lt1"/>
-          </a:fontRef>
-        </p:style>
-        <p:txBody>
-          <a:bodyPr rtlCol="0" anchor="ctr"/>
-          <a:lstStyle/>
-          <a:p>
-            <a:pPr algn="ctr"/>
-            <a:r>
-              <a:rPr lang="pt-PT" dirty="0"/>
-              <a:t>Login</a:t>
-            </a:r>
-          </a:p>
-        </p:txBody>
-      </p:sp>
-      <p:sp>
-        <p:nvSpPr>
           <p:cNvPr id="12" name="Retângulo: Cantos Arredondados 11">
             <a:extLst>
               <a:ext uri="{FF2B5EF4-FFF2-40B4-BE49-F238E27FC236}">
@@ -20768,15 +20687,20 @@
         </p:nvSpPr>
         <p:spPr>
           <a:xfrm>
-            <a:off x="3512736" y="2817796"/>
-            <a:ext cx="1713390" cy="752383"/>
+            <a:off x="6069503" y="3312150"/>
+            <a:ext cx="1503668" cy="316444"/>
           </a:xfrm>
           <a:prstGeom prst="roundRect">
             <a:avLst/>
           </a:prstGeom>
           <a:solidFill>
-            <a:srgbClr val="FF0000"/>
+            <a:srgbClr val="00B0F0"/>
           </a:solidFill>
+          <a:ln>
+            <a:solidFill>
+              <a:srgbClr val="00B0F0"/>
+            </a:solidFill>
+          </a:ln>
         </p:spPr>
         <p:style>
           <a:lnRef idx="2">
@@ -20820,8 +20744,8 @@
         </p:nvSpPr>
         <p:spPr>
           <a:xfrm>
-            <a:off x="3512736" y="5241188"/>
-            <a:ext cx="1713390" cy="752383"/>
+            <a:off x="4744501" y="3315886"/>
+            <a:ext cx="1014602" cy="316444"/>
           </a:xfrm>
           <a:prstGeom prst="roundRect">
             <a:avLst/>
@@ -20829,6 +20753,11 @@
           <a:solidFill>
             <a:srgbClr val="92D050"/>
           </a:solidFill>
+          <a:ln>
+            <a:solidFill>
+              <a:srgbClr val="92D050"/>
+            </a:solidFill>
+          </a:ln>
         </p:spPr>
         <p:style>
           <a:lnRef idx="2">
@@ -20860,101 +20789,6 @@
       </p:sp>
       <p:sp>
         <p:nvSpPr>
-          <p:cNvPr id="19" name="Seta: Para Baixo 18">
-            <a:extLst>
-              <a:ext uri="{FF2B5EF4-FFF2-40B4-BE49-F238E27FC236}">
-                <a16:creationId xmlns:a16="http://schemas.microsoft.com/office/drawing/2014/main" id="{48178D67-D3A5-48D2-B418-056945DB2F4C}"/>
-              </a:ext>
-            </a:extLst>
-          </p:cNvPr>
-          <p:cNvSpPr/>
-          <p:nvPr/>
-        </p:nvSpPr>
-        <p:spPr>
-          <a:xfrm rot="13269331">
-            <a:off x="3077330" y="3619613"/>
-            <a:ext cx="480548" cy="509169"/>
-          </a:xfrm>
-          <a:prstGeom prst="downArrow">
-            <a:avLst>
-              <a:gd name="adj1" fmla="val 50000"/>
-              <a:gd name="adj2" fmla="val 57206"/>
-            </a:avLst>
-          </a:prstGeom>
-        </p:spPr>
-        <p:style>
-          <a:lnRef idx="2">
-            <a:schemeClr val="accent1">
-              <a:shade val="50000"/>
-            </a:schemeClr>
-          </a:lnRef>
-          <a:fillRef idx="1">
-            <a:schemeClr val="accent1"/>
-          </a:fillRef>
-          <a:effectRef idx="0">
-            <a:schemeClr val="accent1"/>
-          </a:effectRef>
-          <a:fontRef idx="minor">
-            <a:schemeClr val="lt1"/>
-          </a:fontRef>
-        </p:style>
-        <p:txBody>
-          <a:bodyPr rtlCol="0" anchor="ctr"/>
-          <a:lstStyle/>
-          <a:p>
-            <a:pPr algn="ctr"/>
-            <a:endParaRPr lang="pt-PT"/>
-          </a:p>
-        </p:txBody>
-      </p:sp>
-      <p:sp>
-        <p:nvSpPr>
-          <p:cNvPr id="20" name="Seta: Para Baixo 19">
-            <a:extLst>
-              <a:ext uri="{FF2B5EF4-FFF2-40B4-BE49-F238E27FC236}">
-                <a16:creationId xmlns:a16="http://schemas.microsoft.com/office/drawing/2014/main" id="{F0B47AE5-97B4-44E2-BDD0-227ACFBBFC73}"/>
-              </a:ext>
-            </a:extLst>
-          </p:cNvPr>
-          <p:cNvSpPr/>
-          <p:nvPr/>
-        </p:nvSpPr>
-        <p:spPr>
-          <a:xfrm rot="18401972">
-            <a:off x="3051227" y="4853179"/>
-            <a:ext cx="459996" cy="435584"/>
-          </a:xfrm>
-          <a:prstGeom prst="downArrow">
-            <a:avLst/>
-          </a:prstGeom>
-        </p:spPr>
-        <p:style>
-          <a:lnRef idx="2">
-            <a:schemeClr val="accent1">
-              <a:shade val="50000"/>
-            </a:schemeClr>
-          </a:lnRef>
-          <a:fillRef idx="1">
-            <a:schemeClr val="accent1"/>
-          </a:fillRef>
-          <a:effectRef idx="0">
-            <a:schemeClr val="accent1"/>
-          </a:effectRef>
-          <a:fontRef idx="minor">
-            <a:schemeClr val="lt1"/>
-          </a:fontRef>
-        </p:style>
-        <p:txBody>
-          <a:bodyPr rtlCol="0" anchor="ctr"/>
-          <a:lstStyle/>
-          <a:p>
-            <a:pPr algn="ctr"/>
-            <a:endParaRPr lang="pt-PT"/>
-          </a:p>
-        </p:txBody>
-      </p:sp>
-      <p:sp>
-        <p:nvSpPr>
           <p:cNvPr id="23" name="Retângulo: Cantos Arredondados 22">
             <a:extLst>
               <a:ext uri="{FF2B5EF4-FFF2-40B4-BE49-F238E27FC236}">
@@ -20967,8 +20801,8 @@
         </p:nvSpPr>
         <p:spPr>
           <a:xfrm>
-            <a:off x="7846822" y="4518916"/>
-            <a:ext cx="712192" cy="300044"/>
+            <a:off x="3590389" y="4764856"/>
+            <a:ext cx="819768" cy="251384"/>
           </a:xfrm>
           <a:prstGeom prst="roundRect">
             <a:avLst/>
@@ -20976,15 +20810,15 @@
         </p:spPr>
         <p:style>
           <a:lnRef idx="2">
-            <a:schemeClr val="accent1">
+            <a:schemeClr val="accent4">
               <a:shade val="50000"/>
             </a:schemeClr>
           </a:lnRef>
           <a:fillRef idx="1">
-            <a:schemeClr val="accent1"/>
+            <a:schemeClr val="accent4"/>
           </a:fillRef>
           <a:effectRef idx="0">
-            <a:schemeClr val="accent1"/>
+            <a:schemeClr val="accent4"/>
           </a:effectRef>
           <a:fontRef idx="minor">
             <a:schemeClr val="lt1"/>
@@ -21016,8 +20850,8 @@
         </p:nvSpPr>
         <p:spPr>
           <a:xfrm>
-            <a:off x="6539288" y="1715066"/>
-            <a:ext cx="1109087" cy="525791"/>
+            <a:off x="3986053" y="2329104"/>
+            <a:ext cx="1109087" cy="360182"/>
           </a:xfrm>
           <a:prstGeom prst="roundRect">
             <a:avLst/>
@@ -21053,10 +20887,56 @@
       </p:sp>
       <p:sp>
         <p:nvSpPr>
-          <p:cNvPr id="25" name="Retângulo: Cantos Arredondados 24">
+          <p:cNvPr id="30" name="Seta: Para a Direita 29">
             <a:extLst>
               <a:ext uri="{FF2B5EF4-FFF2-40B4-BE49-F238E27FC236}">
-                <a16:creationId xmlns:a16="http://schemas.microsoft.com/office/drawing/2014/main" id="{6B314789-E6D8-4999-8AF2-E6E8329BDA8D}"/>
+                <a16:creationId xmlns:a16="http://schemas.microsoft.com/office/drawing/2014/main" id="{05D38B35-D032-45C3-95B6-0AB24896F51B}"/>
+              </a:ext>
+            </a:extLst>
+          </p:cNvPr>
+          <p:cNvSpPr/>
+          <p:nvPr/>
+        </p:nvSpPr>
+        <p:spPr>
+          <a:xfrm rot="5400000">
+            <a:off x="5276023" y="2807920"/>
+            <a:ext cx="441965" cy="284389"/>
+          </a:xfrm>
+          <a:prstGeom prst="rightArrow">
+            <a:avLst/>
+          </a:prstGeom>
+        </p:spPr>
+        <p:style>
+          <a:lnRef idx="2">
+            <a:schemeClr val="accent2">
+              <a:shade val="50000"/>
+            </a:schemeClr>
+          </a:lnRef>
+          <a:fillRef idx="1">
+            <a:schemeClr val="accent2"/>
+          </a:fillRef>
+          <a:effectRef idx="0">
+            <a:schemeClr val="accent2"/>
+          </a:effectRef>
+          <a:fontRef idx="minor">
+            <a:schemeClr val="lt1"/>
+          </a:fontRef>
+        </p:style>
+        <p:txBody>
+          <a:bodyPr rtlCol="0" anchor="ctr"/>
+          <a:lstStyle/>
+          <a:p>
+            <a:pPr algn="ctr"/>
+            <a:endParaRPr lang="pt-PT"/>
+          </a:p>
+        </p:txBody>
+      </p:sp>
+      <p:sp>
+        <p:nvSpPr>
+          <p:cNvPr id="32" name="Retângulo: Cantos Arredondados 31">
+            <a:extLst>
+              <a:ext uri="{FF2B5EF4-FFF2-40B4-BE49-F238E27FC236}">
+                <a16:creationId xmlns:a16="http://schemas.microsoft.com/office/drawing/2014/main" id="{B8A4D62B-37C7-4B1D-840A-33D63D1F29C9}"/>
               </a:ext>
             </a:extLst>
           </p:cNvPr>
@@ -21065,11 +20945,112 @@
         </p:nvSpPr>
         <p:spPr>
           <a:xfrm>
-            <a:off x="6473787" y="2983610"/>
-            <a:ext cx="1559344" cy="527065"/>
+            <a:off x="6011171" y="4755467"/>
+            <a:ext cx="1233055" cy="251384"/>
           </a:xfrm>
           <a:prstGeom prst="roundRect">
             <a:avLst/>
+          </a:prstGeom>
+        </p:spPr>
+        <p:style>
+          <a:lnRef idx="2">
+            <a:schemeClr val="accent4">
+              <a:shade val="50000"/>
+            </a:schemeClr>
+          </a:lnRef>
+          <a:fillRef idx="1">
+            <a:schemeClr val="accent4"/>
+          </a:fillRef>
+          <a:effectRef idx="0">
+            <a:schemeClr val="accent4"/>
+          </a:effectRef>
+          <a:fontRef idx="minor">
+            <a:schemeClr val="lt1"/>
+          </a:fontRef>
+        </p:style>
+        <p:txBody>
+          <a:bodyPr rtlCol="0" anchor="ctr"/>
+          <a:lstStyle/>
+          <a:p>
+            <a:pPr algn="ctr"/>
+            <a:r>
+              <a:rPr lang="pt-PT" dirty="0"/>
+              <a:t>Produtos</a:t>
+            </a:r>
+          </a:p>
+        </p:txBody>
+      </p:sp>
+      <p:sp>
+        <p:nvSpPr>
+          <p:cNvPr id="34" name="Retângulo: Cantos Arredondados 33">
+            <a:extLst>
+              <a:ext uri="{FF2B5EF4-FFF2-40B4-BE49-F238E27FC236}">
+                <a16:creationId xmlns:a16="http://schemas.microsoft.com/office/drawing/2014/main" id="{A85C9CD6-062B-4981-8F1F-1CD4F51E2636}"/>
+              </a:ext>
+            </a:extLst>
+          </p:cNvPr>
+          <p:cNvSpPr/>
+          <p:nvPr/>
+        </p:nvSpPr>
+        <p:spPr>
+          <a:xfrm>
+            <a:off x="7439623" y="4740957"/>
+            <a:ext cx="1233055" cy="265894"/>
+          </a:xfrm>
+          <a:prstGeom prst="roundRect">
+            <a:avLst/>
+          </a:prstGeom>
+        </p:spPr>
+        <p:style>
+          <a:lnRef idx="2">
+            <a:schemeClr val="accent4">
+              <a:shade val="50000"/>
+            </a:schemeClr>
+          </a:lnRef>
+          <a:fillRef idx="1">
+            <a:schemeClr val="accent4"/>
+          </a:fillRef>
+          <a:effectRef idx="0">
+            <a:schemeClr val="accent4"/>
+          </a:effectRef>
+          <a:fontRef idx="minor">
+            <a:schemeClr val="lt1"/>
+          </a:fontRef>
+        </p:style>
+        <p:txBody>
+          <a:bodyPr rtlCol="0" anchor="ctr"/>
+          <a:lstStyle/>
+          <a:p>
+            <a:pPr algn="ctr"/>
+            <a:r>
+              <a:rPr lang="pt-PT" dirty="0"/>
+              <a:t>Contactos</a:t>
+            </a:r>
+          </a:p>
+        </p:txBody>
+      </p:sp>
+      <p:sp>
+        <p:nvSpPr>
+          <p:cNvPr id="36" name="Seta: Para a Direita 35">
+            <a:extLst>
+              <a:ext uri="{FF2B5EF4-FFF2-40B4-BE49-F238E27FC236}">
+                <a16:creationId xmlns:a16="http://schemas.microsoft.com/office/drawing/2014/main" id="{A8C088A3-B985-4089-BBD8-DB692084140C}"/>
+              </a:ext>
+            </a:extLst>
+          </p:cNvPr>
+          <p:cNvSpPr/>
+          <p:nvPr/>
+        </p:nvSpPr>
+        <p:spPr>
+          <a:xfrm rot="5400000">
+            <a:off x="5613816" y="3810245"/>
+            <a:ext cx="632503" cy="581736"/>
+          </a:xfrm>
+          <a:prstGeom prst="rightArrow">
+            <a:avLst>
+              <a:gd name="adj1" fmla="val 50000"/>
+              <a:gd name="adj2" fmla="val 48674"/>
+            </a:avLst>
           </a:prstGeom>
         </p:spPr>
         <p:style>
@@ -21093,19 +21074,16 @@
           <a:lstStyle/>
           <a:p>
             <a:pPr algn="ctr"/>
-            <a:r>
-              <a:rPr lang="pt-PT" dirty="0"/>
-              <a:t>Pedidos Restaurantes</a:t>
-            </a:r>
+            <a:endParaRPr lang="pt-PT"/>
           </a:p>
         </p:txBody>
       </p:sp>
       <p:sp>
         <p:nvSpPr>
-          <p:cNvPr id="26" name="Retângulo: Cantos Arredondados 25">
+          <p:cNvPr id="39" name="Retângulo: Cantos Arredondados 38">
             <a:extLst>
               <a:ext uri="{FF2B5EF4-FFF2-40B4-BE49-F238E27FC236}">
-                <a16:creationId xmlns:a16="http://schemas.microsoft.com/office/drawing/2014/main" id="{8B73B402-D10D-4FB5-B0DE-3812322F64E2}"/>
+                <a16:creationId xmlns:a16="http://schemas.microsoft.com/office/drawing/2014/main" id="{2A31346A-B359-4FB2-AD71-B494148947F4}"/>
               </a:ext>
             </a:extLst>
           </p:cNvPr>
@@ -21114,8 +21092,57 @@
         </p:nvSpPr>
         <p:spPr>
           <a:xfrm>
-            <a:off x="6806718" y="3882648"/>
-            <a:ext cx="1233055" cy="300044"/>
+            <a:off x="5429168" y="1310184"/>
+            <a:ext cx="1333664" cy="349573"/>
+          </a:xfrm>
+          <a:prstGeom prst="roundRect">
+            <a:avLst/>
+          </a:prstGeom>
+        </p:spPr>
+        <p:style>
+          <a:lnRef idx="2">
+            <a:schemeClr val="accent6">
+              <a:shade val="50000"/>
+            </a:schemeClr>
+          </a:lnRef>
+          <a:fillRef idx="1">
+            <a:schemeClr val="accent6"/>
+          </a:fillRef>
+          <a:effectRef idx="0">
+            <a:schemeClr val="accent6"/>
+          </a:effectRef>
+          <a:fontRef idx="minor">
+            <a:schemeClr val="lt1"/>
+          </a:fontRef>
+        </p:style>
+        <p:txBody>
+          <a:bodyPr rtlCol="0" anchor="ctr"/>
+          <a:lstStyle/>
+          <a:p>
+            <a:pPr algn="ctr"/>
+            <a:r>
+              <a:rPr lang="pt-PT" dirty="0"/>
+              <a:t>Inicio</a:t>
+            </a:r>
+          </a:p>
+        </p:txBody>
+      </p:sp>
+      <p:sp>
+        <p:nvSpPr>
+          <p:cNvPr id="40" name="Retângulo: Cantos Arredondados 39">
+            <a:extLst>
+              <a:ext uri="{FF2B5EF4-FFF2-40B4-BE49-F238E27FC236}">
+                <a16:creationId xmlns:a16="http://schemas.microsoft.com/office/drawing/2014/main" id="{8952AFE1-218C-4C77-AC34-68B7CE86A080}"/>
+              </a:ext>
+            </a:extLst>
+          </p:cNvPr>
+          <p:cNvSpPr/>
+          <p:nvPr/>
+        </p:nvSpPr>
+        <p:spPr>
+          <a:xfrm>
+            <a:off x="6699895" y="2309248"/>
+            <a:ext cx="1372197" cy="360182"/>
           </a:xfrm>
           <a:prstGeom prst="roundRect">
             <a:avLst/>
@@ -21151,102 +21178,10 @@
       </p:sp>
       <p:sp>
         <p:nvSpPr>
-          <p:cNvPr id="27" name="Seta: Para a Direita 26">
+          <p:cNvPr id="41" name="Retângulo: Cantos Arredondados 40">
             <a:extLst>
               <a:ext uri="{FF2B5EF4-FFF2-40B4-BE49-F238E27FC236}">
-                <a16:creationId xmlns:a16="http://schemas.microsoft.com/office/drawing/2014/main" id="{4CDA7023-6133-4D65-B0A7-C8D4A659C407}"/>
-              </a:ext>
-            </a:extLst>
-          </p:cNvPr>
-          <p:cNvSpPr/>
-          <p:nvPr/>
-        </p:nvSpPr>
-        <p:spPr>
-          <a:xfrm rot="19283127">
-            <a:off x="4610913" y="1921326"/>
-            <a:ext cx="1960587" cy="396284"/>
-          </a:xfrm>
-          <a:prstGeom prst="rightArrow">
-            <a:avLst/>
-          </a:prstGeom>
-        </p:spPr>
-        <p:style>
-          <a:lnRef idx="2">
-            <a:schemeClr val="accent1">
-              <a:shade val="50000"/>
-            </a:schemeClr>
-          </a:lnRef>
-          <a:fillRef idx="1">
-            <a:schemeClr val="accent1"/>
-          </a:fillRef>
-          <a:effectRef idx="0">
-            <a:schemeClr val="accent1"/>
-          </a:effectRef>
-          <a:fontRef idx="minor">
-            <a:schemeClr val="lt1"/>
-          </a:fontRef>
-        </p:style>
-        <p:txBody>
-          <a:bodyPr rtlCol="0" anchor="ctr"/>
-          <a:lstStyle/>
-          <a:p>
-            <a:pPr algn="ctr"/>
-            <a:endParaRPr lang="pt-PT"/>
-          </a:p>
-        </p:txBody>
-      </p:sp>
-      <p:sp>
-        <p:nvSpPr>
-          <p:cNvPr id="28" name="Seta: Para a Direita 27">
-            <a:extLst>
-              <a:ext uri="{FF2B5EF4-FFF2-40B4-BE49-F238E27FC236}">
-                <a16:creationId xmlns:a16="http://schemas.microsoft.com/office/drawing/2014/main" id="{38D8513E-9C7D-496E-907E-3D89858BB635}"/>
-              </a:ext>
-            </a:extLst>
-          </p:cNvPr>
-          <p:cNvSpPr/>
-          <p:nvPr/>
-        </p:nvSpPr>
-        <p:spPr>
-          <a:xfrm rot="19893008">
-            <a:off x="5167669" y="2370502"/>
-            <a:ext cx="1427986" cy="396284"/>
-          </a:xfrm>
-          <a:prstGeom prst="rightArrow">
-            <a:avLst/>
-          </a:prstGeom>
-        </p:spPr>
-        <p:style>
-          <a:lnRef idx="2">
-            <a:schemeClr val="accent1">
-              <a:shade val="50000"/>
-            </a:schemeClr>
-          </a:lnRef>
-          <a:fillRef idx="1">
-            <a:schemeClr val="accent1"/>
-          </a:fillRef>
-          <a:effectRef idx="0">
-            <a:schemeClr val="accent1"/>
-          </a:effectRef>
-          <a:fontRef idx="minor">
-            <a:schemeClr val="lt1"/>
-          </a:fontRef>
-        </p:style>
-        <p:txBody>
-          <a:bodyPr rtlCol="0" anchor="ctr"/>
-          <a:lstStyle/>
-          <a:p>
-            <a:pPr algn="ctr"/>
-            <a:endParaRPr lang="pt-PT"/>
-          </a:p>
-        </p:txBody>
-      </p:sp>
-      <p:sp>
-        <p:nvSpPr>
-          <p:cNvPr id="29" name="Seta: Para a Direita 28">
-            <a:extLst>
-              <a:ext uri="{FF2B5EF4-FFF2-40B4-BE49-F238E27FC236}">
-                <a16:creationId xmlns:a16="http://schemas.microsoft.com/office/drawing/2014/main" id="{34E30793-E8F9-458C-BDAC-9F825830DB92}"/>
+                <a16:creationId xmlns:a16="http://schemas.microsoft.com/office/drawing/2014/main" id="{F8E3ADE5-B711-464E-ABEC-6C33796535E1}"/>
               </a:ext>
             </a:extLst>
           </p:cNvPr>
@@ -21255,100 +21190,8 @@
         </p:nvSpPr>
         <p:spPr>
           <a:xfrm>
-            <a:off x="5246254" y="3059485"/>
-            <a:ext cx="1227358" cy="396284"/>
-          </a:xfrm>
-          <a:prstGeom prst="rightArrow">
-            <a:avLst/>
-          </a:prstGeom>
-        </p:spPr>
-        <p:style>
-          <a:lnRef idx="2">
-            <a:schemeClr val="accent1">
-              <a:shade val="50000"/>
-            </a:schemeClr>
-          </a:lnRef>
-          <a:fillRef idx="1">
-            <a:schemeClr val="accent1"/>
-          </a:fillRef>
-          <a:effectRef idx="0">
-            <a:schemeClr val="accent1"/>
-          </a:effectRef>
-          <a:fontRef idx="minor">
-            <a:schemeClr val="lt1"/>
-          </a:fontRef>
-        </p:style>
-        <p:txBody>
-          <a:bodyPr rtlCol="0" anchor="ctr"/>
-          <a:lstStyle/>
-          <a:p>
-            <a:pPr algn="ctr"/>
-            <a:endParaRPr lang="pt-PT"/>
-          </a:p>
-        </p:txBody>
-      </p:sp>
-      <p:sp>
-        <p:nvSpPr>
-          <p:cNvPr id="30" name="Seta: Para a Direita 29">
-            <a:extLst>
-              <a:ext uri="{FF2B5EF4-FFF2-40B4-BE49-F238E27FC236}">
-                <a16:creationId xmlns:a16="http://schemas.microsoft.com/office/drawing/2014/main" id="{05D38B35-D032-45C3-95B6-0AB24896F51B}"/>
-              </a:ext>
-            </a:extLst>
-          </p:cNvPr>
-          <p:cNvSpPr/>
-          <p:nvPr/>
-        </p:nvSpPr>
-        <p:spPr>
-          <a:xfrm rot="1049582">
-            <a:off x="5215394" y="3605449"/>
-            <a:ext cx="1575250" cy="396284"/>
-          </a:xfrm>
-          <a:prstGeom prst="rightArrow">
-            <a:avLst/>
-          </a:prstGeom>
-        </p:spPr>
-        <p:style>
-          <a:lnRef idx="2">
-            <a:schemeClr val="accent1">
-              <a:shade val="50000"/>
-            </a:schemeClr>
-          </a:lnRef>
-          <a:fillRef idx="1">
-            <a:schemeClr val="accent1"/>
-          </a:fillRef>
-          <a:effectRef idx="0">
-            <a:schemeClr val="accent1"/>
-          </a:effectRef>
-          <a:fontRef idx="minor">
-            <a:schemeClr val="lt1"/>
-          </a:fontRef>
-        </p:style>
-        <p:txBody>
-          <a:bodyPr rtlCol="0" anchor="ctr"/>
-          <a:lstStyle/>
-          <a:p>
-            <a:pPr algn="ctr"/>
-            <a:endParaRPr lang="pt-PT"/>
-          </a:p>
-        </p:txBody>
-      </p:sp>
-      <p:sp>
-        <p:nvSpPr>
-          <p:cNvPr id="31" name="Retângulo: Cantos Arredondados 30">
-            <a:extLst>
-              <a:ext uri="{FF2B5EF4-FFF2-40B4-BE49-F238E27FC236}">
-                <a16:creationId xmlns:a16="http://schemas.microsoft.com/office/drawing/2014/main" id="{26D9402C-265A-44C8-98D0-87544C04C2BC}"/>
-              </a:ext>
-            </a:extLst>
-          </p:cNvPr>
-          <p:cNvSpPr/>
-          <p:nvPr/>
-        </p:nvSpPr>
-        <p:spPr>
-          <a:xfrm>
-            <a:off x="6371929" y="1233928"/>
-            <a:ext cx="712192" cy="300044"/>
+            <a:off x="5321162" y="2310725"/>
+            <a:ext cx="1227358" cy="357228"/>
           </a:xfrm>
           <a:prstGeom prst="roundRect">
             <a:avLst/>
@@ -21377,17 +21220,17 @@
             <a:pPr algn="ctr"/>
             <a:r>
               <a:rPr lang="pt-PT" dirty="0"/>
-              <a:t>Perfil</a:t>
+              <a:t>Login</a:t>
             </a:r>
           </a:p>
         </p:txBody>
       </p:sp>
       <p:sp>
         <p:nvSpPr>
-          <p:cNvPr id="32" name="Retângulo: Cantos Arredondados 31">
+          <p:cNvPr id="42" name="Retângulo: Cantos Arredondados 41">
             <a:extLst>
               <a:ext uri="{FF2B5EF4-FFF2-40B4-BE49-F238E27FC236}">
-                <a16:creationId xmlns:a16="http://schemas.microsoft.com/office/drawing/2014/main" id="{B8A4D62B-37C7-4B1D-840A-33D63D1F29C9}"/>
+                <a16:creationId xmlns:a16="http://schemas.microsoft.com/office/drawing/2014/main" id="{36C8398F-8B05-4E56-84B9-61982276CD74}"/>
               </a:ext>
             </a:extLst>
           </p:cNvPr>
@@ -21396,8 +21239,114 @@
         </p:nvSpPr>
         <p:spPr>
           <a:xfrm>
-            <a:off x="7648375" y="5097987"/>
-            <a:ext cx="1109087" cy="525791"/>
+            <a:off x="4605554" y="4755467"/>
+            <a:ext cx="1210220" cy="251384"/>
+          </a:xfrm>
+          <a:prstGeom prst="roundRect">
+            <a:avLst/>
+          </a:prstGeom>
+        </p:spPr>
+        <p:style>
+          <a:lnRef idx="2">
+            <a:schemeClr val="accent4">
+              <a:shade val="50000"/>
+            </a:schemeClr>
+          </a:lnRef>
+          <a:fillRef idx="1">
+            <a:schemeClr val="accent4"/>
+          </a:fillRef>
+          <a:effectRef idx="0">
+            <a:schemeClr val="accent4"/>
+          </a:effectRef>
+          <a:fontRef idx="minor">
+            <a:schemeClr val="lt1"/>
+          </a:fontRef>
+        </p:style>
+        <p:txBody>
+          <a:bodyPr rtlCol="0" anchor="ctr"/>
+          <a:lstStyle/>
+          <a:p>
+            <a:pPr algn="ctr"/>
+            <a:r>
+              <a:rPr lang="pt-PT" dirty="0"/>
+              <a:t>Pedidos</a:t>
+            </a:r>
+          </a:p>
+        </p:txBody>
+      </p:sp>
+      <p:sp>
+        <p:nvSpPr>
+          <p:cNvPr id="43" name="Retângulo: Cantos Arredondados 42">
+            <a:extLst>
+              <a:ext uri="{FF2B5EF4-FFF2-40B4-BE49-F238E27FC236}">
+                <a16:creationId xmlns:a16="http://schemas.microsoft.com/office/drawing/2014/main" id="{7A354D0B-5EB1-4B0C-ABF3-3E961D467515}"/>
+              </a:ext>
+            </a:extLst>
+          </p:cNvPr>
+          <p:cNvSpPr/>
+          <p:nvPr/>
+        </p:nvSpPr>
+        <p:spPr>
+          <a:xfrm>
+            <a:off x="3775217" y="5521819"/>
+            <a:ext cx="1210221" cy="250598"/>
+          </a:xfrm>
+          <a:prstGeom prst="roundRect">
+            <a:avLst/>
+          </a:prstGeom>
+          <a:solidFill>
+            <a:srgbClr val="92D050"/>
+          </a:solidFill>
+          <a:ln>
+            <a:solidFill>
+              <a:srgbClr val="92D050"/>
+            </a:solidFill>
+          </a:ln>
+        </p:spPr>
+        <p:style>
+          <a:lnRef idx="2">
+            <a:schemeClr val="accent1">
+              <a:shade val="50000"/>
+            </a:schemeClr>
+          </a:lnRef>
+          <a:fillRef idx="1">
+            <a:schemeClr val="accent1"/>
+          </a:fillRef>
+          <a:effectRef idx="0">
+            <a:schemeClr val="accent1"/>
+          </a:effectRef>
+          <a:fontRef idx="minor">
+            <a:schemeClr val="lt1"/>
+          </a:fontRef>
+        </p:style>
+        <p:txBody>
+          <a:bodyPr rtlCol="0" anchor="ctr"/>
+          <a:lstStyle/>
+          <a:p>
+            <a:pPr algn="ctr"/>
+            <a:r>
+              <a:rPr lang="pt-PT" dirty="0"/>
+              <a:t>Takeaway</a:t>
+            </a:r>
+          </a:p>
+        </p:txBody>
+      </p:sp>
+      <p:sp>
+        <p:nvSpPr>
+          <p:cNvPr id="44" name="Retângulo: Cantos Arredondados 43">
+            <a:extLst>
+              <a:ext uri="{FF2B5EF4-FFF2-40B4-BE49-F238E27FC236}">
+                <a16:creationId xmlns:a16="http://schemas.microsoft.com/office/drawing/2014/main" id="{4EAD56DC-69B8-449B-B4AF-2B0024E8A57F}"/>
+              </a:ext>
+            </a:extLst>
+          </p:cNvPr>
+          <p:cNvSpPr/>
+          <p:nvPr/>
+        </p:nvSpPr>
+        <p:spPr>
+          <a:xfrm>
+            <a:off x="8192442" y="2321578"/>
+            <a:ext cx="1227358" cy="357228"/>
           </a:xfrm>
           <a:prstGeom prst="roundRect">
             <a:avLst/>
@@ -21426,17 +21375,17 @@
             <a:pPr algn="ctr"/>
             <a:r>
               <a:rPr lang="pt-PT" dirty="0"/>
-              <a:t>Produtos</a:t>
+              <a:t>Registar</a:t>
             </a:r>
           </a:p>
         </p:txBody>
       </p:sp>
       <p:sp>
         <p:nvSpPr>
-          <p:cNvPr id="33" name="Retângulo: Cantos Arredondados 32">
+          <p:cNvPr id="45" name="Retângulo: Cantos Arredondados 44">
             <a:extLst>
               <a:ext uri="{FF2B5EF4-FFF2-40B4-BE49-F238E27FC236}">
-                <a16:creationId xmlns:a16="http://schemas.microsoft.com/office/drawing/2014/main" id="{B891FB33-1828-4A4F-A6A6-4B79F3F0239D}"/>
+                <a16:creationId xmlns:a16="http://schemas.microsoft.com/office/drawing/2014/main" id="{2DAE48ED-D585-4574-8462-50526A994A92}"/>
               </a:ext>
             </a:extLst>
           </p:cNvPr>
@@ -21445,8 +21394,8 @@
         </p:nvSpPr>
         <p:spPr>
           <a:xfrm>
-            <a:off x="7423246" y="5730038"/>
-            <a:ext cx="1559344" cy="527065"/>
+            <a:off x="2263567" y="2335342"/>
+            <a:ext cx="1568882" cy="357228"/>
           </a:xfrm>
           <a:prstGeom prst="roundRect">
             <a:avLst/>
@@ -21475,17 +21424,63 @@
             <a:pPr algn="ctr"/>
             <a:r>
               <a:rPr lang="pt-PT" dirty="0"/>
-              <a:t>Pedidos Takeaway</a:t>
+              <a:t>Configurações</a:t>
             </a:r>
           </a:p>
         </p:txBody>
       </p:sp>
       <p:sp>
         <p:nvSpPr>
-          <p:cNvPr id="34" name="Retângulo: Cantos Arredondados 33">
+          <p:cNvPr id="48" name="Seta: Para a Direita 47">
             <a:extLst>
               <a:ext uri="{FF2B5EF4-FFF2-40B4-BE49-F238E27FC236}">
-                <a16:creationId xmlns:a16="http://schemas.microsoft.com/office/drawing/2014/main" id="{A85C9CD6-062B-4981-8F1F-1CD4F51E2636}"/>
+                <a16:creationId xmlns:a16="http://schemas.microsoft.com/office/drawing/2014/main" id="{C2653241-52B4-477C-A7FA-B7DCCDE63576}"/>
+              </a:ext>
+            </a:extLst>
+          </p:cNvPr>
+          <p:cNvSpPr/>
+          <p:nvPr/>
+        </p:nvSpPr>
+        <p:spPr>
+          <a:xfrm rot="5400000">
+            <a:off x="6187763" y="2810342"/>
+            <a:ext cx="457870" cy="263642"/>
+          </a:xfrm>
+          <a:prstGeom prst="rightArrow">
+            <a:avLst/>
+          </a:prstGeom>
+        </p:spPr>
+        <p:style>
+          <a:lnRef idx="2">
+            <a:schemeClr val="accent2">
+              <a:shade val="50000"/>
+            </a:schemeClr>
+          </a:lnRef>
+          <a:fillRef idx="1">
+            <a:schemeClr val="accent2"/>
+          </a:fillRef>
+          <a:effectRef idx="0">
+            <a:schemeClr val="accent2"/>
+          </a:effectRef>
+          <a:fontRef idx="minor">
+            <a:schemeClr val="lt1"/>
+          </a:fontRef>
+        </p:style>
+        <p:txBody>
+          <a:bodyPr rtlCol="0" anchor="ctr"/>
+          <a:lstStyle/>
+          <a:p>
+            <a:pPr algn="ctr"/>
+            <a:endParaRPr lang="pt-PT"/>
+          </a:p>
+        </p:txBody>
+      </p:sp>
+      <p:sp>
+        <p:nvSpPr>
+          <p:cNvPr id="49" name="Retângulo: Cantos Arredondados 48">
+            <a:extLst>
+              <a:ext uri="{FF2B5EF4-FFF2-40B4-BE49-F238E27FC236}">
+                <a16:creationId xmlns:a16="http://schemas.microsoft.com/office/drawing/2014/main" id="{4D3F3890-16B5-4C0E-A429-B1BB8AE87AFA}"/>
               </a:ext>
             </a:extLst>
           </p:cNvPr>
@@ -21494,12 +21489,20 @@
         </p:nvSpPr>
         <p:spPr>
           <a:xfrm>
-            <a:off x="7561491" y="6421431"/>
-            <a:ext cx="1233055" cy="300044"/>
+            <a:off x="5319017" y="5521819"/>
+            <a:ext cx="1556355" cy="250598"/>
           </a:xfrm>
           <a:prstGeom prst="roundRect">
             <a:avLst/>
           </a:prstGeom>
+          <a:solidFill>
+            <a:srgbClr val="00B0F0"/>
+          </a:solidFill>
+          <a:ln>
+            <a:solidFill>
+              <a:srgbClr val="00B0F0"/>
+            </a:solidFill>
+          </a:ln>
         </p:spPr>
         <p:style>
           <a:lnRef idx="2">
@@ -21524,17 +21527,17 @@
             <a:pPr algn="ctr"/>
             <a:r>
               <a:rPr lang="pt-PT" dirty="0"/>
-              <a:t>Contactos</a:t>
+              <a:t>Restaurante</a:t>
             </a:r>
           </a:p>
         </p:txBody>
       </p:sp>
       <p:sp>
         <p:nvSpPr>
-          <p:cNvPr id="35" name="Seta: Para a Direita 34">
+          <p:cNvPr id="51" name="Seta: Para a Direita 50">
             <a:extLst>
               <a:ext uri="{FF2B5EF4-FFF2-40B4-BE49-F238E27FC236}">
-                <a16:creationId xmlns:a16="http://schemas.microsoft.com/office/drawing/2014/main" id="{76919C71-0E7B-4BE1-BD2B-84FD19422FBD}"/>
+                <a16:creationId xmlns:a16="http://schemas.microsoft.com/office/drawing/2014/main" id="{489AEF14-E4D5-4A84-8EF5-289B2CBC681A}"/>
               </a:ext>
             </a:extLst>
           </p:cNvPr>
@@ -21542,9 +21545,9 @@
           <p:nvPr/>
         </p:nvSpPr>
         <p:spPr>
-          <a:xfrm rot="21011947">
-            <a:off x="5172502" y="4755874"/>
-            <a:ext cx="2680589" cy="382590"/>
+          <a:xfrm rot="5400000">
+            <a:off x="5447225" y="5126717"/>
+            <a:ext cx="324640" cy="239900"/>
           </a:xfrm>
           <a:prstGeom prst="rightArrow">
             <a:avLst/>
@@ -21552,15 +21555,15 @@
         </p:spPr>
         <p:style>
           <a:lnRef idx="2">
-            <a:schemeClr val="accent1">
+            <a:schemeClr val="accent2">
               <a:shade val="50000"/>
             </a:schemeClr>
           </a:lnRef>
           <a:fillRef idx="1">
-            <a:schemeClr val="accent1"/>
+            <a:schemeClr val="accent2"/>
           </a:fillRef>
           <a:effectRef idx="0">
-            <a:schemeClr val="accent1"/>
+            <a:schemeClr val="accent2"/>
           </a:effectRef>
           <a:fontRef idx="minor">
             <a:schemeClr val="lt1"/>
@@ -21577,10 +21580,10 @@
       </p:sp>
       <p:sp>
         <p:nvSpPr>
-          <p:cNvPr id="36" name="Seta: Para a Direita 35">
+          <p:cNvPr id="52" name="Seta: Para a Direita 51">
             <a:extLst>
               <a:ext uri="{FF2B5EF4-FFF2-40B4-BE49-F238E27FC236}">
-                <a16:creationId xmlns:a16="http://schemas.microsoft.com/office/drawing/2014/main" id="{A8C088A3-B985-4089-BBD8-DB692084140C}"/>
+                <a16:creationId xmlns:a16="http://schemas.microsoft.com/office/drawing/2014/main" id="{15D36C2C-E3BD-4E7A-AD59-E6194B40AD30}"/>
               </a:ext>
             </a:extLst>
           </p:cNvPr>
@@ -21588,9 +21591,9 @@
           <p:nvPr/>
         </p:nvSpPr>
         <p:spPr>
-          <a:xfrm rot="21299892">
-            <a:off x="5288673" y="5202288"/>
-            <a:ext cx="2358198" cy="382590"/>
+          <a:xfrm rot="5400000">
+            <a:off x="4694721" y="5150630"/>
+            <a:ext cx="324640" cy="239900"/>
           </a:xfrm>
           <a:prstGeom prst="rightArrow">
             <a:avLst/>
@@ -21598,107 +21601,15 @@
         </p:spPr>
         <p:style>
           <a:lnRef idx="2">
-            <a:schemeClr val="accent1">
+            <a:schemeClr val="accent2">
               <a:shade val="50000"/>
             </a:schemeClr>
           </a:lnRef>
           <a:fillRef idx="1">
-            <a:schemeClr val="accent1"/>
+            <a:schemeClr val="accent2"/>
           </a:fillRef>
           <a:effectRef idx="0">
-            <a:schemeClr val="accent1"/>
-          </a:effectRef>
-          <a:fontRef idx="minor">
-            <a:schemeClr val="lt1"/>
-          </a:fontRef>
-        </p:style>
-        <p:txBody>
-          <a:bodyPr rtlCol="0" anchor="ctr"/>
-          <a:lstStyle/>
-          <a:p>
-            <a:pPr algn="ctr"/>
-            <a:endParaRPr lang="pt-PT"/>
-          </a:p>
-        </p:txBody>
-      </p:sp>
-      <p:sp>
-        <p:nvSpPr>
-          <p:cNvPr id="37" name="Seta: Para a Direita 36">
-            <a:extLst>
-              <a:ext uri="{FF2B5EF4-FFF2-40B4-BE49-F238E27FC236}">
-                <a16:creationId xmlns:a16="http://schemas.microsoft.com/office/drawing/2014/main" id="{F6419513-4349-4403-AD51-6CA1EC4E873D}"/>
-              </a:ext>
-            </a:extLst>
-          </p:cNvPr>
-          <p:cNvSpPr/>
-          <p:nvPr/>
-        </p:nvSpPr>
-        <p:spPr>
-          <a:xfrm rot="427396">
-            <a:off x="5266188" y="5686621"/>
-            <a:ext cx="2104205" cy="382590"/>
-          </a:xfrm>
-          <a:prstGeom prst="rightArrow">
-            <a:avLst/>
-          </a:prstGeom>
-        </p:spPr>
-        <p:style>
-          <a:lnRef idx="2">
-            <a:schemeClr val="accent1">
-              <a:shade val="50000"/>
-            </a:schemeClr>
-          </a:lnRef>
-          <a:fillRef idx="1">
-            <a:schemeClr val="accent1"/>
-          </a:fillRef>
-          <a:effectRef idx="0">
-            <a:schemeClr val="accent1"/>
-          </a:effectRef>
-          <a:fontRef idx="minor">
-            <a:schemeClr val="lt1"/>
-          </a:fontRef>
-        </p:style>
-        <p:txBody>
-          <a:bodyPr rtlCol="0" anchor="ctr"/>
-          <a:lstStyle/>
-          <a:p>
-            <a:pPr algn="ctr"/>
-            <a:endParaRPr lang="pt-PT"/>
-          </a:p>
-        </p:txBody>
-      </p:sp>
-      <p:sp>
-        <p:nvSpPr>
-          <p:cNvPr id="38" name="Seta: Para a Direita 37">
-            <a:extLst>
-              <a:ext uri="{FF2B5EF4-FFF2-40B4-BE49-F238E27FC236}">
-                <a16:creationId xmlns:a16="http://schemas.microsoft.com/office/drawing/2014/main" id="{CE11BE1D-08E9-46C6-B27B-73085B5ED133}"/>
-              </a:ext>
-            </a:extLst>
-          </p:cNvPr>
-          <p:cNvSpPr/>
-          <p:nvPr/>
-        </p:nvSpPr>
-        <p:spPr>
-          <a:xfrm rot="699377">
-            <a:off x="5085749" y="6114751"/>
-            <a:ext cx="2474286" cy="382590"/>
-          </a:xfrm>
-          <a:prstGeom prst="rightArrow">
-            <a:avLst/>
-          </a:prstGeom>
-        </p:spPr>
-        <p:style>
-          <a:lnRef idx="2">
-            <a:schemeClr val="accent1">
-              <a:shade val="50000"/>
-            </a:schemeClr>
-          </a:lnRef>
-          <a:fillRef idx="1">
-            <a:schemeClr val="accent1"/>
-          </a:fillRef>
-          <a:effectRef idx="0">
-            <a:schemeClr val="accent1"/>
+            <a:schemeClr val="accent2"/>
           </a:effectRef>
           <a:fontRef idx="minor">
             <a:schemeClr val="lt1"/>

</xml_diff>

<commit_message>
Revert "Implementação do metodo carrinho e melhoramento em diversos layouts "
This reverts commit 275c273504cdfc01fbf5b770ba141b318bac6ab5.
</commit_message>
<xml_diff>
--- a/Documentacao/Gestor Restaurante.pptx
+++ b/Documentacao/Gestor Restaurante.pptx
@@ -212,7 +212,7 @@
           <a:p>
             <a:fld id="{B8CA451F-3F6E-4DFB-8391-7AA6D726B747}" type="datetimeFigureOut">
               <a:rPr lang="pt-PT" smtClean="0"/>
-              <a:t>21/01/2021</a:t>
+              <a:t>20/01/2021</a:t>
             </a:fld>
             <a:endParaRPr lang="pt-PT"/>
           </a:p>
@@ -1690,7 +1690,7 @@
           <a:p>
             <a:fld id="{3BFBD6D2-8034-45F5-95FE-71C76E798512}" type="datetime1">
               <a:rPr lang="en-US" smtClean="0"/>
-              <a:t>1/21/2021</a:t>
+              <a:t>20-Jan-21</a:t>
             </a:fld>
             <a:endParaRPr lang="en-US" dirty="0"/>
           </a:p>
@@ -1924,7 +1924,7 @@
           <a:p>
             <a:fld id="{B70EBEF6-DA40-4662-AC8E-E8C21328E022}" type="datetime1">
               <a:rPr lang="en-US" smtClean="0"/>
-              <a:t>1/21/2021</a:t>
+              <a:t>20-Jan-21</a:t>
             </a:fld>
             <a:endParaRPr lang="en-US" dirty="0"/>
           </a:p>
@@ -2099,7 +2099,7 @@
           <a:p>
             <a:fld id="{BDB6DBDA-1F8E-46CF-89C0-8B0C7130355F}" type="datetime1">
               <a:rPr lang="en-US" smtClean="0"/>
-              <a:t>1/21/2021</a:t>
+              <a:t>20-Jan-21</a:t>
             </a:fld>
             <a:endParaRPr lang="en-US" dirty="0"/>
           </a:p>
@@ -2264,7 +2264,7 @@
           <a:p>
             <a:fld id="{BB63AF9F-D115-458F-A19D-749B59438F6E}" type="datetime1">
               <a:rPr lang="en-US" smtClean="0"/>
-              <a:t>1/21/2021</a:t>
+              <a:t>20-Jan-21</a:t>
             </a:fld>
             <a:endParaRPr lang="en-US" dirty="0"/>
           </a:p>
@@ -2535,7 +2535,7 @@
           <a:p>
             <a:fld id="{DEDA2878-55D1-4289-9664-0A55CE6F784B}" type="datetime1">
               <a:rPr lang="en-US" smtClean="0"/>
-              <a:t>1/21/2021</a:t>
+              <a:t>20-Jan-21</a:t>
             </a:fld>
             <a:endParaRPr lang="en-US" dirty="0"/>
           </a:p>
@@ -3732,7 +3732,7 @@
           <a:p>
             <a:fld id="{63041D4F-7AC4-4977-8E8F-3B268D35311E}" type="datetime1">
               <a:rPr lang="en-US" smtClean="0"/>
-              <a:t>1/21/2021</a:t>
+              <a:t>20-Jan-21</a:t>
             </a:fld>
             <a:endParaRPr lang="en-US" dirty="0"/>
           </a:p>
@@ -4117,7 +4117,7 @@
           <a:p>
             <a:fld id="{B26F9A7D-5AB5-4B5E-9502-0C45821CF6D9}" type="datetime1">
               <a:rPr lang="en-US" smtClean="0"/>
-              <a:t>1/21/2021</a:t>
+              <a:t>20-Jan-21</a:t>
             </a:fld>
             <a:endParaRPr lang="en-US" dirty="0"/>
           </a:p>
@@ -4235,7 +4235,7 @@
           <a:p>
             <a:fld id="{001DF333-46F2-44A3-AB73-E679D0A91A29}" type="datetime1">
               <a:rPr lang="en-US" smtClean="0"/>
-              <a:t>1/21/2021</a:t>
+              <a:t>20-Jan-21</a:t>
             </a:fld>
             <a:endParaRPr lang="en-US" dirty="0"/>
           </a:p>
@@ -4325,7 +4325,7 @@
           <a:p>
             <a:fld id="{03D2EBE6-F9DB-4BCC-9146-E94E307D78CC}" type="datetime1">
               <a:rPr lang="en-US" smtClean="0"/>
-              <a:t>1/21/2021</a:t>
+              <a:t>20-Jan-21</a:t>
             </a:fld>
             <a:endParaRPr lang="en-US" dirty="0"/>
           </a:p>
@@ -5083,7 +5083,7 @@
           <a:p>
             <a:fld id="{5BA6BA5A-F091-4FAE-B627-59A3CCDA4407}" type="datetime1">
               <a:rPr lang="en-US" smtClean="0"/>
-              <a:t>1/21/2021</a:t>
+              <a:t>20-Jan-21</a:t>
             </a:fld>
             <a:endParaRPr lang="en-US" dirty="0"/>
           </a:p>
@@ -5918,7 +5918,7 @@
           <a:p>
             <a:fld id="{9CA5862A-8A16-4342-B181-F1114AC742E0}" type="datetime1">
               <a:rPr lang="en-US" smtClean="0"/>
-              <a:t>1/21/2021</a:t>
+              <a:t>20-Jan-21</a:t>
             </a:fld>
             <a:endParaRPr lang="en-US" dirty="0"/>
           </a:p>
@@ -6140,7 +6140,7 @@
           <a:p>
             <a:fld id="{628DF38F-42B5-4D4D-84DD-715C054A5D2D}" type="datetime1">
               <a:rPr lang="en-US" smtClean="0"/>
-              <a:t>1/21/2021</a:t>
+              <a:t>20-Jan-21</a:t>
             </a:fld>
             <a:endParaRPr lang="en-US" dirty="0"/>
           </a:p>
@@ -14022,8 +14022,13 @@
             </a:pPr>
             <a:r>
               <a:rPr lang="en-US" sz="2800" cap="none" spc="0" dirty="0"/>
-              <a:t>Criar um pedido</a:t>
+              <a:t>Criar um </a:t>
             </a:r>
+            <a:r>
+              <a:rPr lang="en-US" sz="2800" cap="none" spc="0" dirty="0" err="1"/>
+              <a:t>pedido</a:t>
+            </a:r>
+            <a:endParaRPr lang="en-US" sz="2800" cap="none" spc="0" dirty="0"/>
           </a:p>
         </p:txBody>
       </p:sp>
@@ -15697,8 +15702,12 @@
           <a:p>
             <a:pPr algn="ctr"/>
             <a:r>
+              <a:rPr lang="en-US" sz="7200" spc="800" dirty="0" err="1"/>
+              <a:t>Produtos</a:t>
+            </a:r>
+            <a:r>
               <a:rPr lang="en-US" sz="7200" spc="800" dirty="0"/>
-              <a:t>Produtos  Pedidos</a:t>
+              <a:t>  Pedidos</a:t>
             </a:r>
           </a:p>
         </p:txBody>
@@ -16291,8 +16300,28 @@
               <a:buChar char="•"/>
             </a:pPr>
             <a:r>
+              <a:rPr lang="en-US" sz="2800" cap="none" spc="0" dirty="0" err="1"/>
+              <a:t>Adicionar</a:t>
+            </a:r>
+            <a:r>
               <a:rPr lang="en-US" sz="2800" cap="none" spc="0" dirty="0"/>
-              <a:t>Adicionar ao pedido um </a:t>
+              <a:t> </a:t>
+            </a:r>
+            <a:r>
+              <a:rPr lang="en-US" sz="2800" cap="none" spc="0" dirty="0" err="1"/>
+              <a:t>ao</a:t>
+            </a:r>
+            <a:r>
+              <a:rPr lang="en-US" sz="2800" cap="none" spc="0" dirty="0"/>
+              <a:t> </a:t>
+            </a:r>
+            <a:r>
+              <a:rPr lang="en-US" sz="2800" cap="none" spc="0" dirty="0" err="1"/>
+              <a:t>pedido</a:t>
+            </a:r>
+            <a:r>
+              <a:rPr lang="en-US" sz="2800" cap="none" spc="0" dirty="0"/>
+              <a:t> um </a:t>
             </a:r>
             <a:r>
               <a:rPr lang="en-US" sz="2800" cap="none" spc="0" dirty="0" err="1"/>
@@ -20675,6 +20704,58 @@
       </p:sp>
       <p:sp>
         <p:nvSpPr>
+          <p:cNvPr id="11" name="Retângulo: Cantos Arredondados 10">
+            <a:extLst>
+              <a:ext uri="{FF2B5EF4-FFF2-40B4-BE49-F238E27FC236}">
+                <a16:creationId xmlns:a16="http://schemas.microsoft.com/office/drawing/2014/main" id="{3FC25D0E-0087-46C6-84F3-0BEC45A4D4ED}"/>
+              </a:ext>
+            </a:extLst>
+          </p:cNvPr>
+          <p:cNvSpPr/>
+          <p:nvPr/>
+        </p:nvSpPr>
+        <p:spPr>
+          <a:xfrm>
+            <a:off x="1427690" y="4176917"/>
+            <a:ext cx="1713390" cy="752383"/>
+          </a:xfrm>
+          <a:prstGeom prst="roundRect">
+            <a:avLst/>
+          </a:prstGeom>
+          <a:solidFill>
+            <a:srgbClr val="00B0F0"/>
+          </a:solidFill>
+        </p:spPr>
+        <p:style>
+          <a:lnRef idx="2">
+            <a:schemeClr val="accent1">
+              <a:shade val="50000"/>
+            </a:schemeClr>
+          </a:lnRef>
+          <a:fillRef idx="1">
+            <a:schemeClr val="accent1"/>
+          </a:fillRef>
+          <a:effectRef idx="0">
+            <a:schemeClr val="accent1"/>
+          </a:effectRef>
+          <a:fontRef idx="minor">
+            <a:schemeClr val="lt1"/>
+          </a:fontRef>
+        </p:style>
+        <p:txBody>
+          <a:bodyPr rtlCol="0" anchor="ctr"/>
+          <a:lstStyle/>
+          <a:p>
+            <a:pPr algn="ctr"/>
+            <a:r>
+              <a:rPr lang="pt-PT" dirty="0"/>
+              <a:t>Login</a:t>
+            </a:r>
+          </a:p>
+        </p:txBody>
+      </p:sp>
+      <p:sp>
+        <p:nvSpPr>
           <p:cNvPr id="12" name="Retângulo: Cantos Arredondados 11">
             <a:extLst>
               <a:ext uri="{FF2B5EF4-FFF2-40B4-BE49-F238E27FC236}">
@@ -20687,20 +20768,15 @@
         </p:nvSpPr>
         <p:spPr>
           <a:xfrm>
-            <a:off x="6069503" y="3312150"/>
-            <a:ext cx="1503668" cy="316444"/>
+            <a:off x="3512736" y="2817796"/>
+            <a:ext cx="1713390" cy="752383"/>
           </a:xfrm>
           <a:prstGeom prst="roundRect">
             <a:avLst/>
           </a:prstGeom>
           <a:solidFill>
-            <a:srgbClr val="00B0F0"/>
+            <a:srgbClr val="FF0000"/>
           </a:solidFill>
-          <a:ln>
-            <a:solidFill>
-              <a:srgbClr val="00B0F0"/>
-            </a:solidFill>
-          </a:ln>
         </p:spPr>
         <p:style>
           <a:lnRef idx="2">
@@ -20744,8 +20820,8 @@
         </p:nvSpPr>
         <p:spPr>
           <a:xfrm>
-            <a:off x="4744501" y="3315886"/>
-            <a:ext cx="1014602" cy="316444"/>
+            <a:off x="3512736" y="5241188"/>
+            <a:ext cx="1713390" cy="752383"/>
           </a:xfrm>
           <a:prstGeom prst="roundRect">
             <a:avLst/>
@@ -20753,11 +20829,6 @@
           <a:solidFill>
             <a:srgbClr val="92D050"/>
           </a:solidFill>
-          <a:ln>
-            <a:solidFill>
-              <a:srgbClr val="92D050"/>
-            </a:solidFill>
-          </a:ln>
         </p:spPr>
         <p:style>
           <a:lnRef idx="2">
@@ -20789,6 +20860,101 @@
       </p:sp>
       <p:sp>
         <p:nvSpPr>
+          <p:cNvPr id="19" name="Seta: Para Baixo 18">
+            <a:extLst>
+              <a:ext uri="{FF2B5EF4-FFF2-40B4-BE49-F238E27FC236}">
+                <a16:creationId xmlns:a16="http://schemas.microsoft.com/office/drawing/2014/main" id="{48178D67-D3A5-48D2-B418-056945DB2F4C}"/>
+              </a:ext>
+            </a:extLst>
+          </p:cNvPr>
+          <p:cNvSpPr/>
+          <p:nvPr/>
+        </p:nvSpPr>
+        <p:spPr>
+          <a:xfrm rot="13269331">
+            <a:off x="3077330" y="3619613"/>
+            <a:ext cx="480548" cy="509169"/>
+          </a:xfrm>
+          <a:prstGeom prst="downArrow">
+            <a:avLst>
+              <a:gd name="adj1" fmla="val 50000"/>
+              <a:gd name="adj2" fmla="val 57206"/>
+            </a:avLst>
+          </a:prstGeom>
+        </p:spPr>
+        <p:style>
+          <a:lnRef idx="2">
+            <a:schemeClr val="accent1">
+              <a:shade val="50000"/>
+            </a:schemeClr>
+          </a:lnRef>
+          <a:fillRef idx="1">
+            <a:schemeClr val="accent1"/>
+          </a:fillRef>
+          <a:effectRef idx="0">
+            <a:schemeClr val="accent1"/>
+          </a:effectRef>
+          <a:fontRef idx="minor">
+            <a:schemeClr val="lt1"/>
+          </a:fontRef>
+        </p:style>
+        <p:txBody>
+          <a:bodyPr rtlCol="0" anchor="ctr"/>
+          <a:lstStyle/>
+          <a:p>
+            <a:pPr algn="ctr"/>
+            <a:endParaRPr lang="pt-PT"/>
+          </a:p>
+        </p:txBody>
+      </p:sp>
+      <p:sp>
+        <p:nvSpPr>
+          <p:cNvPr id="20" name="Seta: Para Baixo 19">
+            <a:extLst>
+              <a:ext uri="{FF2B5EF4-FFF2-40B4-BE49-F238E27FC236}">
+                <a16:creationId xmlns:a16="http://schemas.microsoft.com/office/drawing/2014/main" id="{F0B47AE5-97B4-44E2-BDD0-227ACFBBFC73}"/>
+              </a:ext>
+            </a:extLst>
+          </p:cNvPr>
+          <p:cNvSpPr/>
+          <p:nvPr/>
+        </p:nvSpPr>
+        <p:spPr>
+          <a:xfrm rot="18401972">
+            <a:off x="3051227" y="4853179"/>
+            <a:ext cx="459996" cy="435584"/>
+          </a:xfrm>
+          <a:prstGeom prst="downArrow">
+            <a:avLst/>
+          </a:prstGeom>
+        </p:spPr>
+        <p:style>
+          <a:lnRef idx="2">
+            <a:schemeClr val="accent1">
+              <a:shade val="50000"/>
+            </a:schemeClr>
+          </a:lnRef>
+          <a:fillRef idx="1">
+            <a:schemeClr val="accent1"/>
+          </a:fillRef>
+          <a:effectRef idx="0">
+            <a:schemeClr val="accent1"/>
+          </a:effectRef>
+          <a:fontRef idx="minor">
+            <a:schemeClr val="lt1"/>
+          </a:fontRef>
+        </p:style>
+        <p:txBody>
+          <a:bodyPr rtlCol="0" anchor="ctr"/>
+          <a:lstStyle/>
+          <a:p>
+            <a:pPr algn="ctr"/>
+            <a:endParaRPr lang="pt-PT"/>
+          </a:p>
+        </p:txBody>
+      </p:sp>
+      <p:sp>
+        <p:nvSpPr>
           <p:cNvPr id="23" name="Retângulo: Cantos Arredondados 22">
             <a:extLst>
               <a:ext uri="{FF2B5EF4-FFF2-40B4-BE49-F238E27FC236}">
@@ -20801,8 +20967,8 @@
         </p:nvSpPr>
         <p:spPr>
           <a:xfrm>
-            <a:off x="3590389" y="4764856"/>
-            <a:ext cx="819768" cy="251384"/>
+            <a:off x="7846822" y="4518916"/>
+            <a:ext cx="712192" cy="300044"/>
           </a:xfrm>
           <a:prstGeom prst="roundRect">
             <a:avLst/>
@@ -20810,15 +20976,15 @@
         </p:spPr>
         <p:style>
           <a:lnRef idx="2">
-            <a:schemeClr val="accent4">
+            <a:schemeClr val="accent1">
               <a:shade val="50000"/>
             </a:schemeClr>
           </a:lnRef>
           <a:fillRef idx="1">
-            <a:schemeClr val="accent4"/>
+            <a:schemeClr val="accent1"/>
           </a:fillRef>
           <a:effectRef idx="0">
-            <a:schemeClr val="accent4"/>
+            <a:schemeClr val="accent1"/>
           </a:effectRef>
           <a:fontRef idx="minor">
             <a:schemeClr val="lt1"/>
@@ -20850,8 +21016,8 @@
         </p:nvSpPr>
         <p:spPr>
           <a:xfrm>
-            <a:off x="3986053" y="2329104"/>
-            <a:ext cx="1109087" cy="360182"/>
+            <a:off x="6539288" y="1715066"/>
+            <a:ext cx="1109087" cy="525791"/>
           </a:xfrm>
           <a:prstGeom prst="roundRect">
             <a:avLst/>
@@ -20887,56 +21053,10 @@
       </p:sp>
       <p:sp>
         <p:nvSpPr>
-          <p:cNvPr id="30" name="Seta: Para a Direita 29">
+          <p:cNvPr id="25" name="Retângulo: Cantos Arredondados 24">
             <a:extLst>
               <a:ext uri="{FF2B5EF4-FFF2-40B4-BE49-F238E27FC236}">
-                <a16:creationId xmlns:a16="http://schemas.microsoft.com/office/drawing/2014/main" id="{05D38B35-D032-45C3-95B6-0AB24896F51B}"/>
-              </a:ext>
-            </a:extLst>
-          </p:cNvPr>
-          <p:cNvSpPr/>
-          <p:nvPr/>
-        </p:nvSpPr>
-        <p:spPr>
-          <a:xfrm rot="5400000">
-            <a:off x="5276023" y="2807920"/>
-            <a:ext cx="441965" cy="284389"/>
-          </a:xfrm>
-          <a:prstGeom prst="rightArrow">
-            <a:avLst/>
-          </a:prstGeom>
-        </p:spPr>
-        <p:style>
-          <a:lnRef idx="2">
-            <a:schemeClr val="accent2">
-              <a:shade val="50000"/>
-            </a:schemeClr>
-          </a:lnRef>
-          <a:fillRef idx="1">
-            <a:schemeClr val="accent2"/>
-          </a:fillRef>
-          <a:effectRef idx="0">
-            <a:schemeClr val="accent2"/>
-          </a:effectRef>
-          <a:fontRef idx="minor">
-            <a:schemeClr val="lt1"/>
-          </a:fontRef>
-        </p:style>
-        <p:txBody>
-          <a:bodyPr rtlCol="0" anchor="ctr"/>
-          <a:lstStyle/>
-          <a:p>
-            <a:pPr algn="ctr"/>
-            <a:endParaRPr lang="pt-PT"/>
-          </a:p>
-        </p:txBody>
-      </p:sp>
-      <p:sp>
-        <p:nvSpPr>
-          <p:cNvPr id="32" name="Retângulo: Cantos Arredondados 31">
-            <a:extLst>
-              <a:ext uri="{FF2B5EF4-FFF2-40B4-BE49-F238E27FC236}">
-                <a16:creationId xmlns:a16="http://schemas.microsoft.com/office/drawing/2014/main" id="{B8A4D62B-37C7-4B1D-840A-33D63D1F29C9}"/>
+                <a16:creationId xmlns:a16="http://schemas.microsoft.com/office/drawing/2014/main" id="{6B314789-E6D8-4999-8AF2-E6E8329BDA8D}"/>
               </a:ext>
             </a:extLst>
           </p:cNvPr>
@@ -20945,112 +21065,11 @@
         </p:nvSpPr>
         <p:spPr>
           <a:xfrm>
-            <a:off x="6011171" y="4755467"/>
-            <a:ext cx="1233055" cy="251384"/>
+            <a:off x="6473787" y="2983610"/>
+            <a:ext cx="1559344" cy="527065"/>
           </a:xfrm>
           <a:prstGeom prst="roundRect">
             <a:avLst/>
-          </a:prstGeom>
-        </p:spPr>
-        <p:style>
-          <a:lnRef idx="2">
-            <a:schemeClr val="accent4">
-              <a:shade val="50000"/>
-            </a:schemeClr>
-          </a:lnRef>
-          <a:fillRef idx="1">
-            <a:schemeClr val="accent4"/>
-          </a:fillRef>
-          <a:effectRef idx="0">
-            <a:schemeClr val="accent4"/>
-          </a:effectRef>
-          <a:fontRef idx="minor">
-            <a:schemeClr val="lt1"/>
-          </a:fontRef>
-        </p:style>
-        <p:txBody>
-          <a:bodyPr rtlCol="0" anchor="ctr"/>
-          <a:lstStyle/>
-          <a:p>
-            <a:pPr algn="ctr"/>
-            <a:r>
-              <a:rPr lang="pt-PT" dirty="0"/>
-              <a:t>Produtos</a:t>
-            </a:r>
-          </a:p>
-        </p:txBody>
-      </p:sp>
-      <p:sp>
-        <p:nvSpPr>
-          <p:cNvPr id="34" name="Retângulo: Cantos Arredondados 33">
-            <a:extLst>
-              <a:ext uri="{FF2B5EF4-FFF2-40B4-BE49-F238E27FC236}">
-                <a16:creationId xmlns:a16="http://schemas.microsoft.com/office/drawing/2014/main" id="{A85C9CD6-062B-4981-8F1F-1CD4F51E2636}"/>
-              </a:ext>
-            </a:extLst>
-          </p:cNvPr>
-          <p:cNvSpPr/>
-          <p:nvPr/>
-        </p:nvSpPr>
-        <p:spPr>
-          <a:xfrm>
-            <a:off x="7439623" y="4740957"/>
-            <a:ext cx="1233055" cy="265894"/>
-          </a:xfrm>
-          <a:prstGeom prst="roundRect">
-            <a:avLst/>
-          </a:prstGeom>
-        </p:spPr>
-        <p:style>
-          <a:lnRef idx="2">
-            <a:schemeClr val="accent4">
-              <a:shade val="50000"/>
-            </a:schemeClr>
-          </a:lnRef>
-          <a:fillRef idx="1">
-            <a:schemeClr val="accent4"/>
-          </a:fillRef>
-          <a:effectRef idx="0">
-            <a:schemeClr val="accent4"/>
-          </a:effectRef>
-          <a:fontRef idx="minor">
-            <a:schemeClr val="lt1"/>
-          </a:fontRef>
-        </p:style>
-        <p:txBody>
-          <a:bodyPr rtlCol="0" anchor="ctr"/>
-          <a:lstStyle/>
-          <a:p>
-            <a:pPr algn="ctr"/>
-            <a:r>
-              <a:rPr lang="pt-PT" dirty="0"/>
-              <a:t>Contactos</a:t>
-            </a:r>
-          </a:p>
-        </p:txBody>
-      </p:sp>
-      <p:sp>
-        <p:nvSpPr>
-          <p:cNvPr id="36" name="Seta: Para a Direita 35">
-            <a:extLst>
-              <a:ext uri="{FF2B5EF4-FFF2-40B4-BE49-F238E27FC236}">
-                <a16:creationId xmlns:a16="http://schemas.microsoft.com/office/drawing/2014/main" id="{A8C088A3-B985-4089-BBD8-DB692084140C}"/>
-              </a:ext>
-            </a:extLst>
-          </p:cNvPr>
-          <p:cNvSpPr/>
-          <p:nvPr/>
-        </p:nvSpPr>
-        <p:spPr>
-          <a:xfrm rot="5400000">
-            <a:off x="5613816" y="3810245"/>
-            <a:ext cx="632503" cy="581736"/>
-          </a:xfrm>
-          <a:prstGeom prst="rightArrow">
-            <a:avLst>
-              <a:gd name="adj1" fmla="val 50000"/>
-              <a:gd name="adj2" fmla="val 48674"/>
-            </a:avLst>
           </a:prstGeom>
         </p:spPr>
         <p:style>
@@ -21074,16 +21093,19 @@
           <a:lstStyle/>
           <a:p>
             <a:pPr algn="ctr"/>
-            <a:endParaRPr lang="pt-PT"/>
+            <a:r>
+              <a:rPr lang="pt-PT" dirty="0"/>
+              <a:t>Pedidos Restaurantes</a:t>
+            </a:r>
           </a:p>
         </p:txBody>
       </p:sp>
       <p:sp>
         <p:nvSpPr>
-          <p:cNvPr id="39" name="Retângulo: Cantos Arredondados 38">
+          <p:cNvPr id="26" name="Retângulo: Cantos Arredondados 25">
             <a:extLst>
               <a:ext uri="{FF2B5EF4-FFF2-40B4-BE49-F238E27FC236}">
-                <a16:creationId xmlns:a16="http://schemas.microsoft.com/office/drawing/2014/main" id="{2A31346A-B359-4FB2-AD71-B494148947F4}"/>
+                <a16:creationId xmlns:a16="http://schemas.microsoft.com/office/drawing/2014/main" id="{8B73B402-D10D-4FB5-B0DE-3812322F64E2}"/>
               </a:ext>
             </a:extLst>
           </p:cNvPr>
@@ -21092,57 +21114,8 @@
         </p:nvSpPr>
         <p:spPr>
           <a:xfrm>
-            <a:off x="5429168" y="1310184"/>
-            <a:ext cx="1333664" cy="349573"/>
-          </a:xfrm>
-          <a:prstGeom prst="roundRect">
-            <a:avLst/>
-          </a:prstGeom>
-        </p:spPr>
-        <p:style>
-          <a:lnRef idx="2">
-            <a:schemeClr val="accent6">
-              <a:shade val="50000"/>
-            </a:schemeClr>
-          </a:lnRef>
-          <a:fillRef idx="1">
-            <a:schemeClr val="accent6"/>
-          </a:fillRef>
-          <a:effectRef idx="0">
-            <a:schemeClr val="accent6"/>
-          </a:effectRef>
-          <a:fontRef idx="minor">
-            <a:schemeClr val="lt1"/>
-          </a:fontRef>
-        </p:style>
-        <p:txBody>
-          <a:bodyPr rtlCol="0" anchor="ctr"/>
-          <a:lstStyle/>
-          <a:p>
-            <a:pPr algn="ctr"/>
-            <a:r>
-              <a:rPr lang="pt-PT" dirty="0"/>
-              <a:t>Inicio</a:t>
-            </a:r>
-          </a:p>
-        </p:txBody>
-      </p:sp>
-      <p:sp>
-        <p:nvSpPr>
-          <p:cNvPr id="40" name="Retângulo: Cantos Arredondados 39">
-            <a:extLst>
-              <a:ext uri="{FF2B5EF4-FFF2-40B4-BE49-F238E27FC236}">
-                <a16:creationId xmlns:a16="http://schemas.microsoft.com/office/drawing/2014/main" id="{8952AFE1-218C-4C77-AC34-68B7CE86A080}"/>
-              </a:ext>
-            </a:extLst>
-          </p:cNvPr>
-          <p:cNvSpPr/>
-          <p:nvPr/>
-        </p:nvSpPr>
-        <p:spPr>
-          <a:xfrm>
-            <a:off x="6699895" y="2309248"/>
-            <a:ext cx="1372197" cy="360182"/>
+            <a:off x="6806718" y="3882648"/>
+            <a:ext cx="1233055" cy="300044"/>
           </a:xfrm>
           <a:prstGeom prst="roundRect">
             <a:avLst/>
@@ -21178,10 +21151,102 @@
       </p:sp>
       <p:sp>
         <p:nvSpPr>
-          <p:cNvPr id="41" name="Retângulo: Cantos Arredondados 40">
+          <p:cNvPr id="27" name="Seta: Para a Direita 26">
             <a:extLst>
               <a:ext uri="{FF2B5EF4-FFF2-40B4-BE49-F238E27FC236}">
-                <a16:creationId xmlns:a16="http://schemas.microsoft.com/office/drawing/2014/main" id="{F8E3ADE5-B711-464E-ABEC-6C33796535E1}"/>
+                <a16:creationId xmlns:a16="http://schemas.microsoft.com/office/drawing/2014/main" id="{4CDA7023-6133-4D65-B0A7-C8D4A659C407}"/>
+              </a:ext>
+            </a:extLst>
+          </p:cNvPr>
+          <p:cNvSpPr/>
+          <p:nvPr/>
+        </p:nvSpPr>
+        <p:spPr>
+          <a:xfrm rot="19283127">
+            <a:off x="4610913" y="1921326"/>
+            <a:ext cx="1960587" cy="396284"/>
+          </a:xfrm>
+          <a:prstGeom prst="rightArrow">
+            <a:avLst/>
+          </a:prstGeom>
+        </p:spPr>
+        <p:style>
+          <a:lnRef idx="2">
+            <a:schemeClr val="accent1">
+              <a:shade val="50000"/>
+            </a:schemeClr>
+          </a:lnRef>
+          <a:fillRef idx="1">
+            <a:schemeClr val="accent1"/>
+          </a:fillRef>
+          <a:effectRef idx="0">
+            <a:schemeClr val="accent1"/>
+          </a:effectRef>
+          <a:fontRef idx="minor">
+            <a:schemeClr val="lt1"/>
+          </a:fontRef>
+        </p:style>
+        <p:txBody>
+          <a:bodyPr rtlCol="0" anchor="ctr"/>
+          <a:lstStyle/>
+          <a:p>
+            <a:pPr algn="ctr"/>
+            <a:endParaRPr lang="pt-PT"/>
+          </a:p>
+        </p:txBody>
+      </p:sp>
+      <p:sp>
+        <p:nvSpPr>
+          <p:cNvPr id="28" name="Seta: Para a Direita 27">
+            <a:extLst>
+              <a:ext uri="{FF2B5EF4-FFF2-40B4-BE49-F238E27FC236}">
+                <a16:creationId xmlns:a16="http://schemas.microsoft.com/office/drawing/2014/main" id="{38D8513E-9C7D-496E-907E-3D89858BB635}"/>
+              </a:ext>
+            </a:extLst>
+          </p:cNvPr>
+          <p:cNvSpPr/>
+          <p:nvPr/>
+        </p:nvSpPr>
+        <p:spPr>
+          <a:xfrm rot="19893008">
+            <a:off x="5167669" y="2370502"/>
+            <a:ext cx="1427986" cy="396284"/>
+          </a:xfrm>
+          <a:prstGeom prst="rightArrow">
+            <a:avLst/>
+          </a:prstGeom>
+        </p:spPr>
+        <p:style>
+          <a:lnRef idx="2">
+            <a:schemeClr val="accent1">
+              <a:shade val="50000"/>
+            </a:schemeClr>
+          </a:lnRef>
+          <a:fillRef idx="1">
+            <a:schemeClr val="accent1"/>
+          </a:fillRef>
+          <a:effectRef idx="0">
+            <a:schemeClr val="accent1"/>
+          </a:effectRef>
+          <a:fontRef idx="minor">
+            <a:schemeClr val="lt1"/>
+          </a:fontRef>
+        </p:style>
+        <p:txBody>
+          <a:bodyPr rtlCol="0" anchor="ctr"/>
+          <a:lstStyle/>
+          <a:p>
+            <a:pPr algn="ctr"/>
+            <a:endParaRPr lang="pt-PT"/>
+          </a:p>
+        </p:txBody>
+      </p:sp>
+      <p:sp>
+        <p:nvSpPr>
+          <p:cNvPr id="29" name="Seta: Para a Direita 28">
+            <a:extLst>
+              <a:ext uri="{FF2B5EF4-FFF2-40B4-BE49-F238E27FC236}">
+                <a16:creationId xmlns:a16="http://schemas.microsoft.com/office/drawing/2014/main" id="{34E30793-E8F9-458C-BDAC-9F825830DB92}"/>
               </a:ext>
             </a:extLst>
           </p:cNvPr>
@@ -21190,8 +21255,100 @@
         </p:nvSpPr>
         <p:spPr>
           <a:xfrm>
-            <a:off x="5321162" y="2310725"/>
-            <a:ext cx="1227358" cy="357228"/>
+            <a:off x="5246254" y="3059485"/>
+            <a:ext cx="1227358" cy="396284"/>
+          </a:xfrm>
+          <a:prstGeom prst="rightArrow">
+            <a:avLst/>
+          </a:prstGeom>
+        </p:spPr>
+        <p:style>
+          <a:lnRef idx="2">
+            <a:schemeClr val="accent1">
+              <a:shade val="50000"/>
+            </a:schemeClr>
+          </a:lnRef>
+          <a:fillRef idx="1">
+            <a:schemeClr val="accent1"/>
+          </a:fillRef>
+          <a:effectRef idx="0">
+            <a:schemeClr val="accent1"/>
+          </a:effectRef>
+          <a:fontRef idx="minor">
+            <a:schemeClr val="lt1"/>
+          </a:fontRef>
+        </p:style>
+        <p:txBody>
+          <a:bodyPr rtlCol="0" anchor="ctr"/>
+          <a:lstStyle/>
+          <a:p>
+            <a:pPr algn="ctr"/>
+            <a:endParaRPr lang="pt-PT"/>
+          </a:p>
+        </p:txBody>
+      </p:sp>
+      <p:sp>
+        <p:nvSpPr>
+          <p:cNvPr id="30" name="Seta: Para a Direita 29">
+            <a:extLst>
+              <a:ext uri="{FF2B5EF4-FFF2-40B4-BE49-F238E27FC236}">
+                <a16:creationId xmlns:a16="http://schemas.microsoft.com/office/drawing/2014/main" id="{05D38B35-D032-45C3-95B6-0AB24896F51B}"/>
+              </a:ext>
+            </a:extLst>
+          </p:cNvPr>
+          <p:cNvSpPr/>
+          <p:nvPr/>
+        </p:nvSpPr>
+        <p:spPr>
+          <a:xfrm rot="1049582">
+            <a:off x="5215394" y="3605449"/>
+            <a:ext cx="1575250" cy="396284"/>
+          </a:xfrm>
+          <a:prstGeom prst="rightArrow">
+            <a:avLst/>
+          </a:prstGeom>
+        </p:spPr>
+        <p:style>
+          <a:lnRef idx="2">
+            <a:schemeClr val="accent1">
+              <a:shade val="50000"/>
+            </a:schemeClr>
+          </a:lnRef>
+          <a:fillRef idx="1">
+            <a:schemeClr val="accent1"/>
+          </a:fillRef>
+          <a:effectRef idx="0">
+            <a:schemeClr val="accent1"/>
+          </a:effectRef>
+          <a:fontRef idx="minor">
+            <a:schemeClr val="lt1"/>
+          </a:fontRef>
+        </p:style>
+        <p:txBody>
+          <a:bodyPr rtlCol="0" anchor="ctr"/>
+          <a:lstStyle/>
+          <a:p>
+            <a:pPr algn="ctr"/>
+            <a:endParaRPr lang="pt-PT"/>
+          </a:p>
+        </p:txBody>
+      </p:sp>
+      <p:sp>
+        <p:nvSpPr>
+          <p:cNvPr id="31" name="Retângulo: Cantos Arredondados 30">
+            <a:extLst>
+              <a:ext uri="{FF2B5EF4-FFF2-40B4-BE49-F238E27FC236}">
+                <a16:creationId xmlns:a16="http://schemas.microsoft.com/office/drawing/2014/main" id="{26D9402C-265A-44C8-98D0-87544C04C2BC}"/>
+              </a:ext>
+            </a:extLst>
+          </p:cNvPr>
+          <p:cNvSpPr/>
+          <p:nvPr/>
+        </p:nvSpPr>
+        <p:spPr>
+          <a:xfrm>
+            <a:off x="6371929" y="1233928"/>
+            <a:ext cx="712192" cy="300044"/>
           </a:xfrm>
           <a:prstGeom prst="roundRect">
             <a:avLst/>
@@ -21220,17 +21377,17 @@
             <a:pPr algn="ctr"/>
             <a:r>
               <a:rPr lang="pt-PT" dirty="0"/>
-              <a:t>Login</a:t>
+              <a:t>Perfil</a:t>
             </a:r>
           </a:p>
         </p:txBody>
       </p:sp>
       <p:sp>
         <p:nvSpPr>
-          <p:cNvPr id="42" name="Retângulo: Cantos Arredondados 41">
+          <p:cNvPr id="32" name="Retângulo: Cantos Arredondados 31">
             <a:extLst>
               <a:ext uri="{FF2B5EF4-FFF2-40B4-BE49-F238E27FC236}">
-                <a16:creationId xmlns:a16="http://schemas.microsoft.com/office/drawing/2014/main" id="{36C8398F-8B05-4E56-84B9-61982276CD74}"/>
+                <a16:creationId xmlns:a16="http://schemas.microsoft.com/office/drawing/2014/main" id="{B8A4D62B-37C7-4B1D-840A-33D63D1F29C9}"/>
               </a:ext>
             </a:extLst>
           </p:cNvPr>
@@ -21239,114 +21396,8 @@
         </p:nvSpPr>
         <p:spPr>
           <a:xfrm>
-            <a:off x="4605554" y="4755467"/>
-            <a:ext cx="1210220" cy="251384"/>
-          </a:xfrm>
-          <a:prstGeom prst="roundRect">
-            <a:avLst/>
-          </a:prstGeom>
-        </p:spPr>
-        <p:style>
-          <a:lnRef idx="2">
-            <a:schemeClr val="accent4">
-              <a:shade val="50000"/>
-            </a:schemeClr>
-          </a:lnRef>
-          <a:fillRef idx="1">
-            <a:schemeClr val="accent4"/>
-          </a:fillRef>
-          <a:effectRef idx="0">
-            <a:schemeClr val="accent4"/>
-          </a:effectRef>
-          <a:fontRef idx="minor">
-            <a:schemeClr val="lt1"/>
-          </a:fontRef>
-        </p:style>
-        <p:txBody>
-          <a:bodyPr rtlCol="0" anchor="ctr"/>
-          <a:lstStyle/>
-          <a:p>
-            <a:pPr algn="ctr"/>
-            <a:r>
-              <a:rPr lang="pt-PT" dirty="0"/>
-              <a:t>Pedidos</a:t>
-            </a:r>
-          </a:p>
-        </p:txBody>
-      </p:sp>
-      <p:sp>
-        <p:nvSpPr>
-          <p:cNvPr id="43" name="Retângulo: Cantos Arredondados 42">
-            <a:extLst>
-              <a:ext uri="{FF2B5EF4-FFF2-40B4-BE49-F238E27FC236}">
-                <a16:creationId xmlns:a16="http://schemas.microsoft.com/office/drawing/2014/main" id="{7A354D0B-5EB1-4B0C-ABF3-3E961D467515}"/>
-              </a:ext>
-            </a:extLst>
-          </p:cNvPr>
-          <p:cNvSpPr/>
-          <p:nvPr/>
-        </p:nvSpPr>
-        <p:spPr>
-          <a:xfrm>
-            <a:off x="3775217" y="5521819"/>
-            <a:ext cx="1210221" cy="250598"/>
-          </a:xfrm>
-          <a:prstGeom prst="roundRect">
-            <a:avLst/>
-          </a:prstGeom>
-          <a:solidFill>
-            <a:srgbClr val="92D050"/>
-          </a:solidFill>
-          <a:ln>
-            <a:solidFill>
-              <a:srgbClr val="92D050"/>
-            </a:solidFill>
-          </a:ln>
-        </p:spPr>
-        <p:style>
-          <a:lnRef idx="2">
-            <a:schemeClr val="accent1">
-              <a:shade val="50000"/>
-            </a:schemeClr>
-          </a:lnRef>
-          <a:fillRef idx="1">
-            <a:schemeClr val="accent1"/>
-          </a:fillRef>
-          <a:effectRef idx="0">
-            <a:schemeClr val="accent1"/>
-          </a:effectRef>
-          <a:fontRef idx="minor">
-            <a:schemeClr val="lt1"/>
-          </a:fontRef>
-        </p:style>
-        <p:txBody>
-          <a:bodyPr rtlCol="0" anchor="ctr"/>
-          <a:lstStyle/>
-          <a:p>
-            <a:pPr algn="ctr"/>
-            <a:r>
-              <a:rPr lang="pt-PT" dirty="0"/>
-              <a:t>Takeaway</a:t>
-            </a:r>
-          </a:p>
-        </p:txBody>
-      </p:sp>
-      <p:sp>
-        <p:nvSpPr>
-          <p:cNvPr id="44" name="Retângulo: Cantos Arredondados 43">
-            <a:extLst>
-              <a:ext uri="{FF2B5EF4-FFF2-40B4-BE49-F238E27FC236}">
-                <a16:creationId xmlns:a16="http://schemas.microsoft.com/office/drawing/2014/main" id="{4EAD56DC-69B8-449B-B4AF-2B0024E8A57F}"/>
-              </a:ext>
-            </a:extLst>
-          </p:cNvPr>
-          <p:cNvSpPr/>
-          <p:nvPr/>
-        </p:nvSpPr>
-        <p:spPr>
-          <a:xfrm>
-            <a:off x="8192442" y="2321578"/>
-            <a:ext cx="1227358" cy="357228"/>
+            <a:off x="7648375" y="5097987"/>
+            <a:ext cx="1109087" cy="525791"/>
           </a:xfrm>
           <a:prstGeom prst="roundRect">
             <a:avLst/>
@@ -21375,17 +21426,17 @@
             <a:pPr algn="ctr"/>
             <a:r>
               <a:rPr lang="pt-PT" dirty="0"/>
-              <a:t>Registar</a:t>
+              <a:t>Produtos</a:t>
             </a:r>
           </a:p>
         </p:txBody>
       </p:sp>
       <p:sp>
         <p:nvSpPr>
-          <p:cNvPr id="45" name="Retângulo: Cantos Arredondados 44">
+          <p:cNvPr id="33" name="Retângulo: Cantos Arredondados 32">
             <a:extLst>
               <a:ext uri="{FF2B5EF4-FFF2-40B4-BE49-F238E27FC236}">
-                <a16:creationId xmlns:a16="http://schemas.microsoft.com/office/drawing/2014/main" id="{2DAE48ED-D585-4574-8462-50526A994A92}"/>
+                <a16:creationId xmlns:a16="http://schemas.microsoft.com/office/drawing/2014/main" id="{B891FB33-1828-4A4F-A6A6-4B79F3F0239D}"/>
               </a:ext>
             </a:extLst>
           </p:cNvPr>
@@ -21394,8 +21445,8 @@
         </p:nvSpPr>
         <p:spPr>
           <a:xfrm>
-            <a:off x="2263567" y="2335342"/>
-            <a:ext cx="1568882" cy="357228"/>
+            <a:off x="7423246" y="5730038"/>
+            <a:ext cx="1559344" cy="527065"/>
           </a:xfrm>
           <a:prstGeom prst="roundRect">
             <a:avLst/>
@@ -21424,63 +21475,17 @@
             <a:pPr algn="ctr"/>
             <a:r>
               <a:rPr lang="pt-PT" dirty="0"/>
-              <a:t>Configurações</a:t>
+              <a:t>Pedidos Takeaway</a:t>
             </a:r>
           </a:p>
         </p:txBody>
       </p:sp>
       <p:sp>
         <p:nvSpPr>
-          <p:cNvPr id="48" name="Seta: Para a Direita 47">
+          <p:cNvPr id="34" name="Retângulo: Cantos Arredondados 33">
             <a:extLst>
               <a:ext uri="{FF2B5EF4-FFF2-40B4-BE49-F238E27FC236}">
-                <a16:creationId xmlns:a16="http://schemas.microsoft.com/office/drawing/2014/main" id="{C2653241-52B4-477C-A7FA-B7DCCDE63576}"/>
-              </a:ext>
-            </a:extLst>
-          </p:cNvPr>
-          <p:cNvSpPr/>
-          <p:nvPr/>
-        </p:nvSpPr>
-        <p:spPr>
-          <a:xfrm rot="5400000">
-            <a:off x="6187763" y="2810342"/>
-            <a:ext cx="457870" cy="263642"/>
-          </a:xfrm>
-          <a:prstGeom prst="rightArrow">
-            <a:avLst/>
-          </a:prstGeom>
-        </p:spPr>
-        <p:style>
-          <a:lnRef idx="2">
-            <a:schemeClr val="accent2">
-              <a:shade val="50000"/>
-            </a:schemeClr>
-          </a:lnRef>
-          <a:fillRef idx="1">
-            <a:schemeClr val="accent2"/>
-          </a:fillRef>
-          <a:effectRef idx="0">
-            <a:schemeClr val="accent2"/>
-          </a:effectRef>
-          <a:fontRef idx="minor">
-            <a:schemeClr val="lt1"/>
-          </a:fontRef>
-        </p:style>
-        <p:txBody>
-          <a:bodyPr rtlCol="0" anchor="ctr"/>
-          <a:lstStyle/>
-          <a:p>
-            <a:pPr algn="ctr"/>
-            <a:endParaRPr lang="pt-PT"/>
-          </a:p>
-        </p:txBody>
-      </p:sp>
-      <p:sp>
-        <p:nvSpPr>
-          <p:cNvPr id="49" name="Retângulo: Cantos Arredondados 48">
-            <a:extLst>
-              <a:ext uri="{FF2B5EF4-FFF2-40B4-BE49-F238E27FC236}">
-                <a16:creationId xmlns:a16="http://schemas.microsoft.com/office/drawing/2014/main" id="{4D3F3890-16B5-4C0E-A429-B1BB8AE87AFA}"/>
+                <a16:creationId xmlns:a16="http://schemas.microsoft.com/office/drawing/2014/main" id="{A85C9CD6-062B-4981-8F1F-1CD4F51E2636}"/>
               </a:ext>
             </a:extLst>
           </p:cNvPr>
@@ -21489,20 +21494,12 @@
         </p:nvSpPr>
         <p:spPr>
           <a:xfrm>
-            <a:off x="5319017" y="5521819"/>
-            <a:ext cx="1556355" cy="250598"/>
+            <a:off x="7561491" y="6421431"/>
+            <a:ext cx="1233055" cy="300044"/>
           </a:xfrm>
           <a:prstGeom prst="roundRect">
             <a:avLst/>
           </a:prstGeom>
-          <a:solidFill>
-            <a:srgbClr val="00B0F0"/>
-          </a:solidFill>
-          <a:ln>
-            <a:solidFill>
-              <a:srgbClr val="00B0F0"/>
-            </a:solidFill>
-          </a:ln>
         </p:spPr>
         <p:style>
           <a:lnRef idx="2">
@@ -21527,17 +21524,17 @@
             <a:pPr algn="ctr"/>
             <a:r>
               <a:rPr lang="pt-PT" dirty="0"/>
-              <a:t>Restaurante</a:t>
+              <a:t>Contactos</a:t>
             </a:r>
           </a:p>
         </p:txBody>
       </p:sp>
       <p:sp>
         <p:nvSpPr>
-          <p:cNvPr id="51" name="Seta: Para a Direita 50">
+          <p:cNvPr id="35" name="Seta: Para a Direita 34">
             <a:extLst>
               <a:ext uri="{FF2B5EF4-FFF2-40B4-BE49-F238E27FC236}">
-                <a16:creationId xmlns:a16="http://schemas.microsoft.com/office/drawing/2014/main" id="{489AEF14-E4D5-4A84-8EF5-289B2CBC681A}"/>
+                <a16:creationId xmlns:a16="http://schemas.microsoft.com/office/drawing/2014/main" id="{76919C71-0E7B-4BE1-BD2B-84FD19422FBD}"/>
               </a:ext>
             </a:extLst>
           </p:cNvPr>
@@ -21545,9 +21542,9 @@
           <p:nvPr/>
         </p:nvSpPr>
         <p:spPr>
-          <a:xfrm rot="5400000">
-            <a:off x="5447225" y="5126717"/>
-            <a:ext cx="324640" cy="239900"/>
+          <a:xfrm rot="21011947">
+            <a:off x="5172502" y="4755874"/>
+            <a:ext cx="2680589" cy="382590"/>
           </a:xfrm>
           <a:prstGeom prst="rightArrow">
             <a:avLst/>
@@ -21555,15 +21552,15 @@
         </p:spPr>
         <p:style>
           <a:lnRef idx="2">
-            <a:schemeClr val="accent2">
+            <a:schemeClr val="accent1">
               <a:shade val="50000"/>
             </a:schemeClr>
           </a:lnRef>
           <a:fillRef idx="1">
-            <a:schemeClr val="accent2"/>
+            <a:schemeClr val="accent1"/>
           </a:fillRef>
           <a:effectRef idx="0">
-            <a:schemeClr val="accent2"/>
+            <a:schemeClr val="accent1"/>
           </a:effectRef>
           <a:fontRef idx="minor">
             <a:schemeClr val="lt1"/>
@@ -21580,10 +21577,10 @@
       </p:sp>
       <p:sp>
         <p:nvSpPr>
-          <p:cNvPr id="52" name="Seta: Para a Direita 51">
+          <p:cNvPr id="36" name="Seta: Para a Direita 35">
             <a:extLst>
               <a:ext uri="{FF2B5EF4-FFF2-40B4-BE49-F238E27FC236}">
-                <a16:creationId xmlns:a16="http://schemas.microsoft.com/office/drawing/2014/main" id="{15D36C2C-E3BD-4E7A-AD59-E6194B40AD30}"/>
+                <a16:creationId xmlns:a16="http://schemas.microsoft.com/office/drawing/2014/main" id="{A8C088A3-B985-4089-BBD8-DB692084140C}"/>
               </a:ext>
             </a:extLst>
           </p:cNvPr>
@@ -21591,9 +21588,9 @@
           <p:nvPr/>
         </p:nvSpPr>
         <p:spPr>
-          <a:xfrm rot="5400000">
-            <a:off x="4694721" y="5150630"/>
-            <a:ext cx="324640" cy="239900"/>
+          <a:xfrm rot="21299892">
+            <a:off x="5288673" y="5202288"/>
+            <a:ext cx="2358198" cy="382590"/>
           </a:xfrm>
           <a:prstGeom prst="rightArrow">
             <a:avLst/>
@@ -21601,15 +21598,107 @@
         </p:spPr>
         <p:style>
           <a:lnRef idx="2">
-            <a:schemeClr val="accent2">
+            <a:schemeClr val="accent1">
               <a:shade val="50000"/>
             </a:schemeClr>
           </a:lnRef>
           <a:fillRef idx="1">
-            <a:schemeClr val="accent2"/>
+            <a:schemeClr val="accent1"/>
           </a:fillRef>
           <a:effectRef idx="0">
-            <a:schemeClr val="accent2"/>
+            <a:schemeClr val="accent1"/>
+          </a:effectRef>
+          <a:fontRef idx="minor">
+            <a:schemeClr val="lt1"/>
+          </a:fontRef>
+        </p:style>
+        <p:txBody>
+          <a:bodyPr rtlCol="0" anchor="ctr"/>
+          <a:lstStyle/>
+          <a:p>
+            <a:pPr algn="ctr"/>
+            <a:endParaRPr lang="pt-PT"/>
+          </a:p>
+        </p:txBody>
+      </p:sp>
+      <p:sp>
+        <p:nvSpPr>
+          <p:cNvPr id="37" name="Seta: Para a Direita 36">
+            <a:extLst>
+              <a:ext uri="{FF2B5EF4-FFF2-40B4-BE49-F238E27FC236}">
+                <a16:creationId xmlns:a16="http://schemas.microsoft.com/office/drawing/2014/main" id="{F6419513-4349-4403-AD51-6CA1EC4E873D}"/>
+              </a:ext>
+            </a:extLst>
+          </p:cNvPr>
+          <p:cNvSpPr/>
+          <p:nvPr/>
+        </p:nvSpPr>
+        <p:spPr>
+          <a:xfrm rot="427396">
+            <a:off x="5266188" y="5686621"/>
+            <a:ext cx="2104205" cy="382590"/>
+          </a:xfrm>
+          <a:prstGeom prst="rightArrow">
+            <a:avLst/>
+          </a:prstGeom>
+        </p:spPr>
+        <p:style>
+          <a:lnRef idx="2">
+            <a:schemeClr val="accent1">
+              <a:shade val="50000"/>
+            </a:schemeClr>
+          </a:lnRef>
+          <a:fillRef idx="1">
+            <a:schemeClr val="accent1"/>
+          </a:fillRef>
+          <a:effectRef idx="0">
+            <a:schemeClr val="accent1"/>
+          </a:effectRef>
+          <a:fontRef idx="minor">
+            <a:schemeClr val="lt1"/>
+          </a:fontRef>
+        </p:style>
+        <p:txBody>
+          <a:bodyPr rtlCol="0" anchor="ctr"/>
+          <a:lstStyle/>
+          <a:p>
+            <a:pPr algn="ctr"/>
+            <a:endParaRPr lang="pt-PT"/>
+          </a:p>
+        </p:txBody>
+      </p:sp>
+      <p:sp>
+        <p:nvSpPr>
+          <p:cNvPr id="38" name="Seta: Para a Direita 37">
+            <a:extLst>
+              <a:ext uri="{FF2B5EF4-FFF2-40B4-BE49-F238E27FC236}">
+                <a16:creationId xmlns:a16="http://schemas.microsoft.com/office/drawing/2014/main" id="{CE11BE1D-08E9-46C6-B27B-73085B5ED133}"/>
+              </a:ext>
+            </a:extLst>
+          </p:cNvPr>
+          <p:cNvSpPr/>
+          <p:nvPr/>
+        </p:nvSpPr>
+        <p:spPr>
+          <a:xfrm rot="699377">
+            <a:off x="5085749" y="6114751"/>
+            <a:ext cx="2474286" cy="382590"/>
+          </a:xfrm>
+          <a:prstGeom prst="rightArrow">
+            <a:avLst/>
+          </a:prstGeom>
+        </p:spPr>
+        <p:style>
+          <a:lnRef idx="2">
+            <a:schemeClr val="accent1">
+              <a:shade val="50000"/>
+            </a:schemeClr>
+          </a:lnRef>
+          <a:fillRef idx="1">
+            <a:schemeClr val="accent1"/>
+          </a:fillRef>
+          <a:effectRef idx="0">
+            <a:schemeClr val="accent1"/>
           </a:effectRef>
           <a:fontRef idx="minor">
             <a:schemeClr val="lt1"/>

</xml_diff>

<commit_message>
Revert "Revert "Implementação do metodo carrinho e melhoramento em diversos layouts ""
This reverts commit 3ff77b721c1f0ef43e25fcce907945ba3403c485.
</commit_message>
<xml_diff>
--- a/Documentacao/Gestor Restaurante.pptx
+++ b/Documentacao/Gestor Restaurante.pptx
@@ -212,7 +212,7 @@
           <a:p>
             <a:fld id="{B8CA451F-3F6E-4DFB-8391-7AA6D726B747}" type="datetimeFigureOut">
               <a:rPr lang="pt-PT" smtClean="0"/>
-              <a:t>20/01/2021</a:t>
+              <a:t>21/01/2021</a:t>
             </a:fld>
             <a:endParaRPr lang="pt-PT"/>
           </a:p>
@@ -1690,7 +1690,7 @@
           <a:p>
             <a:fld id="{3BFBD6D2-8034-45F5-95FE-71C76E798512}" type="datetime1">
               <a:rPr lang="en-US" smtClean="0"/>
-              <a:t>20-Jan-21</a:t>
+              <a:t>1/21/2021</a:t>
             </a:fld>
             <a:endParaRPr lang="en-US" dirty="0"/>
           </a:p>
@@ -1924,7 +1924,7 @@
           <a:p>
             <a:fld id="{B70EBEF6-DA40-4662-AC8E-E8C21328E022}" type="datetime1">
               <a:rPr lang="en-US" smtClean="0"/>
-              <a:t>20-Jan-21</a:t>
+              <a:t>1/21/2021</a:t>
             </a:fld>
             <a:endParaRPr lang="en-US" dirty="0"/>
           </a:p>
@@ -2099,7 +2099,7 @@
           <a:p>
             <a:fld id="{BDB6DBDA-1F8E-46CF-89C0-8B0C7130355F}" type="datetime1">
               <a:rPr lang="en-US" smtClean="0"/>
-              <a:t>20-Jan-21</a:t>
+              <a:t>1/21/2021</a:t>
             </a:fld>
             <a:endParaRPr lang="en-US" dirty="0"/>
           </a:p>
@@ -2264,7 +2264,7 @@
           <a:p>
             <a:fld id="{BB63AF9F-D115-458F-A19D-749B59438F6E}" type="datetime1">
               <a:rPr lang="en-US" smtClean="0"/>
-              <a:t>20-Jan-21</a:t>
+              <a:t>1/21/2021</a:t>
             </a:fld>
             <a:endParaRPr lang="en-US" dirty="0"/>
           </a:p>
@@ -2535,7 +2535,7 @@
           <a:p>
             <a:fld id="{DEDA2878-55D1-4289-9664-0A55CE6F784B}" type="datetime1">
               <a:rPr lang="en-US" smtClean="0"/>
-              <a:t>20-Jan-21</a:t>
+              <a:t>1/21/2021</a:t>
             </a:fld>
             <a:endParaRPr lang="en-US" dirty="0"/>
           </a:p>
@@ -3732,7 +3732,7 @@
           <a:p>
             <a:fld id="{63041D4F-7AC4-4977-8E8F-3B268D35311E}" type="datetime1">
               <a:rPr lang="en-US" smtClean="0"/>
-              <a:t>20-Jan-21</a:t>
+              <a:t>1/21/2021</a:t>
             </a:fld>
             <a:endParaRPr lang="en-US" dirty="0"/>
           </a:p>
@@ -4117,7 +4117,7 @@
           <a:p>
             <a:fld id="{B26F9A7D-5AB5-4B5E-9502-0C45821CF6D9}" type="datetime1">
               <a:rPr lang="en-US" smtClean="0"/>
-              <a:t>20-Jan-21</a:t>
+              <a:t>1/21/2021</a:t>
             </a:fld>
             <a:endParaRPr lang="en-US" dirty="0"/>
           </a:p>
@@ -4235,7 +4235,7 @@
           <a:p>
             <a:fld id="{001DF333-46F2-44A3-AB73-E679D0A91A29}" type="datetime1">
               <a:rPr lang="en-US" smtClean="0"/>
-              <a:t>20-Jan-21</a:t>
+              <a:t>1/21/2021</a:t>
             </a:fld>
             <a:endParaRPr lang="en-US" dirty="0"/>
           </a:p>
@@ -4325,7 +4325,7 @@
           <a:p>
             <a:fld id="{03D2EBE6-F9DB-4BCC-9146-E94E307D78CC}" type="datetime1">
               <a:rPr lang="en-US" smtClean="0"/>
-              <a:t>20-Jan-21</a:t>
+              <a:t>1/21/2021</a:t>
             </a:fld>
             <a:endParaRPr lang="en-US" dirty="0"/>
           </a:p>
@@ -5083,7 +5083,7 @@
           <a:p>
             <a:fld id="{5BA6BA5A-F091-4FAE-B627-59A3CCDA4407}" type="datetime1">
               <a:rPr lang="en-US" smtClean="0"/>
-              <a:t>20-Jan-21</a:t>
+              <a:t>1/21/2021</a:t>
             </a:fld>
             <a:endParaRPr lang="en-US" dirty="0"/>
           </a:p>
@@ -5918,7 +5918,7 @@
           <a:p>
             <a:fld id="{9CA5862A-8A16-4342-B181-F1114AC742E0}" type="datetime1">
               <a:rPr lang="en-US" smtClean="0"/>
-              <a:t>20-Jan-21</a:t>
+              <a:t>1/21/2021</a:t>
             </a:fld>
             <a:endParaRPr lang="en-US" dirty="0"/>
           </a:p>
@@ -6140,7 +6140,7 @@
           <a:p>
             <a:fld id="{628DF38F-42B5-4D4D-84DD-715C054A5D2D}" type="datetime1">
               <a:rPr lang="en-US" smtClean="0"/>
-              <a:t>20-Jan-21</a:t>
+              <a:t>1/21/2021</a:t>
             </a:fld>
             <a:endParaRPr lang="en-US" dirty="0"/>
           </a:p>
@@ -14022,13 +14022,8 @@
             </a:pPr>
             <a:r>
               <a:rPr lang="en-US" sz="2800" cap="none" spc="0" dirty="0"/>
-              <a:t>Criar um </a:t>
+              <a:t>Criar um pedido</a:t>
             </a:r>
-            <a:r>
-              <a:rPr lang="en-US" sz="2800" cap="none" spc="0" dirty="0" err="1"/>
-              <a:t>pedido</a:t>
-            </a:r>
-            <a:endParaRPr lang="en-US" sz="2800" cap="none" spc="0" dirty="0"/>
           </a:p>
         </p:txBody>
       </p:sp>
@@ -15702,12 +15697,8 @@
           <a:p>
             <a:pPr algn="ctr"/>
             <a:r>
-              <a:rPr lang="en-US" sz="7200" spc="800" dirty="0" err="1"/>
-              <a:t>Produtos</a:t>
-            </a:r>
-            <a:r>
               <a:rPr lang="en-US" sz="7200" spc="800" dirty="0"/>
-              <a:t>  Pedidos</a:t>
+              <a:t>Produtos  Pedidos</a:t>
             </a:r>
           </a:p>
         </p:txBody>
@@ -16300,28 +16291,8 @@
               <a:buChar char="•"/>
             </a:pPr>
             <a:r>
-              <a:rPr lang="en-US" sz="2800" cap="none" spc="0" dirty="0" err="1"/>
-              <a:t>Adicionar</a:t>
-            </a:r>
-            <a:r>
               <a:rPr lang="en-US" sz="2800" cap="none" spc="0" dirty="0"/>
-              <a:t> </a:t>
-            </a:r>
-            <a:r>
-              <a:rPr lang="en-US" sz="2800" cap="none" spc="0" dirty="0" err="1"/>
-              <a:t>ao</a:t>
-            </a:r>
-            <a:r>
-              <a:rPr lang="en-US" sz="2800" cap="none" spc="0" dirty="0"/>
-              <a:t> </a:t>
-            </a:r>
-            <a:r>
-              <a:rPr lang="en-US" sz="2800" cap="none" spc="0" dirty="0" err="1"/>
-              <a:t>pedido</a:t>
-            </a:r>
-            <a:r>
-              <a:rPr lang="en-US" sz="2800" cap="none" spc="0" dirty="0"/>
-              <a:t> um </a:t>
+              <a:t>Adicionar ao pedido um </a:t>
             </a:r>
             <a:r>
               <a:rPr lang="en-US" sz="2800" cap="none" spc="0" dirty="0" err="1"/>
@@ -20704,58 +20675,6 @@
       </p:sp>
       <p:sp>
         <p:nvSpPr>
-          <p:cNvPr id="11" name="Retângulo: Cantos Arredondados 10">
-            <a:extLst>
-              <a:ext uri="{FF2B5EF4-FFF2-40B4-BE49-F238E27FC236}">
-                <a16:creationId xmlns:a16="http://schemas.microsoft.com/office/drawing/2014/main" id="{3FC25D0E-0087-46C6-84F3-0BEC45A4D4ED}"/>
-              </a:ext>
-            </a:extLst>
-          </p:cNvPr>
-          <p:cNvSpPr/>
-          <p:nvPr/>
-        </p:nvSpPr>
-        <p:spPr>
-          <a:xfrm>
-            <a:off x="1427690" y="4176917"/>
-            <a:ext cx="1713390" cy="752383"/>
-          </a:xfrm>
-          <a:prstGeom prst="roundRect">
-            <a:avLst/>
-          </a:prstGeom>
-          <a:solidFill>
-            <a:srgbClr val="00B0F0"/>
-          </a:solidFill>
-        </p:spPr>
-        <p:style>
-          <a:lnRef idx="2">
-            <a:schemeClr val="accent1">
-              <a:shade val="50000"/>
-            </a:schemeClr>
-          </a:lnRef>
-          <a:fillRef idx="1">
-            <a:schemeClr val="accent1"/>
-          </a:fillRef>
-          <a:effectRef idx="0">
-            <a:schemeClr val="accent1"/>
-          </a:effectRef>
-          <a:fontRef idx="minor">
-            <a:schemeClr val="lt1"/>
-          </a:fontRef>
-        </p:style>
-        <p:txBody>
-          <a:bodyPr rtlCol="0" anchor="ctr"/>
-          <a:lstStyle/>
-          <a:p>
-            <a:pPr algn="ctr"/>
-            <a:r>
-              <a:rPr lang="pt-PT" dirty="0"/>
-              <a:t>Login</a:t>
-            </a:r>
-          </a:p>
-        </p:txBody>
-      </p:sp>
-      <p:sp>
-        <p:nvSpPr>
           <p:cNvPr id="12" name="Retângulo: Cantos Arredondados 11">
             <a:extLst>
               <a:ext uri="{FF2B5EF4-FFF2-40B4-BE49-F238E27FC236}">
@@ -20768,15 +20687,20 @@
         </p:nvSpPr>
         <p:spPr>
           <a:xfrm>
-            <a:off x="3512736" y="2817796"/>
-            <a:ext cx="1713390" cy="752383"/>
+            <a:off x="6069503" y="3312150"/>
+            <a:ext cx="1503668" cy="316444"/>
           </a:xfrm>
           <a:prstGeom prst="roundRect">
             <a:avLst/>
           </a:prstGeom>
           <a:solidFill>
-            <a:srgbClr val="FF0000"/>
+            <a:srgbClr val="00B0F0"/>
           </a:solidFill>
+          <a:ln>
+            <a:solidFill>
+              <a:srgbClr val="00B0F0"/>
+            </a:solidFill>
+          </a:ln>
         </p:spPr>
         <p:style>
           <a:lnRef idx="2">
@@ -20820,8 +20744,8 @@
         </p:nvSpPr>
         <p:spPr>
           <a:xfrm>
-            <a:off x="3512736" y="5241188"/>
-            <a:ext cx="1713390" cy="752383"/>
+            <a:off x="4744501" y="3315886"/>
+            <a:ext cx="1014602" cy="316444"/>
           </a:xfrm>
           <a:prstGeom prst="roundRect">
             <a:avLst/>
@@ -20829,6 +20753,11 @@
           <a:solidFill>
             <a:srgbClr val="92D050"/>
           </a:solidFill>
+          <a:ln>
+            <a:solidFill>
+              <a:srgbClr val="92D050"/>
+            </a:solidFill>
+          </a:ln>
         </p:spPr>
         <p:style>
           <a:lnRef idx="2">
@@ -20860,101 +20789,6 @@
       </p:sp>
       <p:sp>
         <p:nvSpPr>
-          <p:cNvPr id="19" name="Seta: Para Baixo 18">
-            <a:extLst>
-              <a:ext uri="{FF2B5EF4-FFF2-40B4-BE49-F238E27FC236}">
-                <a16:creationId xmlns:a16="http://schemas.microsoft.com/office/drawing/2014/main" id="{48178D67-D3A5-48D2-B418-056945DB2F4C}"/>
-              </a:ext>
-            </a:extLst>
-          </p:cNvPr>
-          <p:cNvSpPr/>
-          <p:nvPr/>
-        </p:nvSpPr>
-        <p:spPr>
-          <a:xfrm rot="13269331">
-            <a:off x="3077330" y="3619613"/>
-            <a:ext cx="480548" cy="509169"/>
-          </a:xfrm>
-          <a:prstGeom prst="downArrow">
-            <a:avLst>
-              <a:gd name="adj1" fmla="val 50000"/>
-              <a:gd name="adj2" fmla="val 57206"/>
-            </a:avLst>
-          </a:prstGeom>
-        </p:spPr>
-        <p:style>
-          <a:lnRef idx="2">
-            <a:schemeClr val="accent1">
-              <a:shade val="50000"/>
-            </a:schemeClr>
-          </a:lnRef>
-          <a:fillRef idx="1">
-            <a:schemeClr val="accent1"/>
-          </a:fillRef>
-          <a:effectRef idx="0">
-            <a:schemeClr val="accent1"/>
-          </a:effectRef>
-          <a:fontRef idx="minor">
-            <a:schemeClr val="lt1"/>
-          </a:fontRef>
-        </p:style>
-        <p:txBody>
-          <a:bodyPr rtlCol="0" anchor="ctr"/>
-          <a:lstStyle/>
-          <a:p>
-            <a:pPr algn="ctr"/>
-            <a:endParaRPr lang="pt-PT"/>
-          </a:p>
-        </p:txBody>
-      </p:sp>
-      <p:sp>
-        <p:nvSpPr>
-          <p:cNvPr id="20" name="Seta: Para Baixo 19">
-            <a:extLst>
-              <a:ext uri="{FF2B5EF4-FFF2-40B4-BE49-F238E27FC236}">
-                <a16:creationId xmlns:a16="http://schemas.microsoft.com/office/drawing/2014/main" id="{F0B47AE5-97B4-44E2-BDD0-227ACFBBFC73}"/>
-              </a:ext>
-            </a:extLst>
-          </p:cNvPr>
-          <p:cNvSpPr/>
-          <p:nvPr/>
-        </p:nvSpPr>
-        <p:spPr>
-          <a:xfrm rot="18401972">
-            <a:off x="3051227" y="4853179"/>
-            <a:ext cx="459996" cy="435584"/>
-          </a:xfrm>
-          <a:prstGeom prst="downArrow">
-            <a:avLst/>
-          </a:prstGeom>
-        </p:spPr>
-        <p:style>
-          <a:lnRef idx="2">
-            <a:schemeClr val="accent1">
-              <a:shade val="50000"/>
-            </a:schemeClr>
-          </a:lnRef>
-          <a:fillRef idx="1">
-            <a:schemeClr val="accent1"/>
-          </a:fillRef>
-          <a:effectRef idx="0">
-            <a:schemeClr val="accent1"/>
-          </a:effectRef>
-          <a:fontRef idx="minor">
-            <a:schemeClr val="lt1"/>
-          </a:fontRef>
-        </p:style>
-        <p:txBody>
-          <a:bodyPr rtlCol="0" anchor="ctr"/>
-          <a:lstStyle/>
-          <a:p>
-            <a:pPr algn="ctr"/>
-            <a:endParaRPr lang="pt-PT"/>
-          </a:p>
-        </p:txBody>
-      </p:sp>
-      <p:sp>
-        <p:nvSpPr>
           <p:cNvPr id="23" name="Retângulo: Cantos Arredondados 22">
             <a:extLst>
               <a:ext uri="{FF2B5EF4-FFF2-40B4-BE49-F238E27FC236}">
@@ -20967,8 +20801,8 @@
         </p:nvSpPr>
         <p:spPr>
           <a:xfrm>
-            <a:off x="7846822" y="4518916"/>
-            <a:ext cx="712192" cy="300044"/>
+            <a:off x="3590389" y="4764856"/>
+            <a:ext cx="819768" cy="251384"/>
           </a:xfrm>
           <a:prstGeom prst="roundRect">
             <a:avLst/>
@@ -20976,15 +20810,15 @@
         </p:spPr>
         <p:style>
           <a:lnRef idx="2">
-            <a:schemeClr val="accent1">
+            <a:schemeClr val="accent4">
               <a:shade val="50000"/>
             </a:schemeClr>
           </a:lnRef>
           <a:fillRef idx="1">
-            <a:schemeClr val="accent1"/>
+            <a:schemeClr val="accent4"/>
           </a:fillRef>
           <a:effectRef idx="0">
-            <a:schemeClr val="accent1"/>
+            <a:schemeClr val="accent4"/>
           </a:effectRef>
           <a:fontRef idx="minor">
             <a:schemeClr val="lt1"/>
@@ -21016,8 +20850,8 @@
         </p:nvSpPr>
         <p:spPr>
           <a:xfrm>
-            <a:off x="6539288" y="1715066"/>
-            <a:ext cx="1109087" cy="525791"/>
+            <a:off x="3986053" y="2329104"/>
+            <a:ext cx="1109087" cy="360182"/>
           </a:xfrm>
           <a:prstGeom prst="roundRect">
             <a:avLst/>
@@ -21053,10 +20887,56 @@
       </p:sp>
       <p:sp>
         <p:nvSpPr>
-          <p:cNvPr id="25" name="Retângulo: Cantos Arredondados 24">
+          <p:cNvPr id="30" name="Seta: Para a Direita 29">
             <a:extLst>
               <a:ext uri="{FF2B5EF4-FFF2-40B4-BE49-F238E27FC236}">
-                <a16:creationId xmlns:a16="http://schemas.microsoft.com/office/drawing/2014/main" id="{6B314789-E6D8-4999-8AF2-E6E8329BDA8D}"/>
+                <a16:creationId xmlns:a16="http://schemas.microsoft.com/office/drawing/2014/main" id="{05D38B35-D032-45C3-95B6-0AB24896F51B}"/>
+              </a:ext>
+            </a:extLst>
+          </p:cNvPr>
+          <p:cNvSpPr/>
+          <p:nvPr/>
+        </p:nvSpPr>
+        <p:spPr>
+          <a:xfrm rot="5400000">
+            <a:off x="5276023" y="2807920"/>
+            <a:ext cx="441965" cy="284389"/>
+          </a:xfrm>
+          <a:prstGeom prst="rightArrow">
+            <a:avLst/>
+          </a:prstGeom>
+        </p:spPr>
+        <p:style>
+          <a:lnRef idx="2">
+            <a:schemeClr val="accent2">
+              <a:shade val="50000"/>
+            </a:schemeClr>
+          </a:lnRef>
+          <a:fillRef idx="1">
+            <a:schemeClr val="accent2"/>
+          </a:fillRef>
+          <a:effectRef idx="0">
+            <a:schemeClr val="accent2"/>
+          </a:effectRef>
+          <a:fontRef idx="minor">
+            <a:schemeClr val="lt1"/>
+          </a:fontRef>
+        </p:style>
+        <p:txBody>
+          <a:bodyPr rtlCol="0" anchor="ctr"/>
+          <a:lstStyle/>
+          <a:p>
+            <a:pPr algn="ctr"/>
+            <a:endParaRPr lang="pt-PT"/>
+          </a:p>
+        </p:txBody>
+      </p:sp>
+      <p:sp>
+        <p:nvSpPr>
+          <p:cNvPr id="32" name="Retângulo: Cantos Arredondados 31">
+            <a:extLst>
+              <a:ext uri="{FF2B5EF4-FFF2-40B4-BE49-F238E27FC236}">
+                <a16:creationId xmlns:a16="http://schemas.microsoft.com/office/drawing/2014/main" id="{B8A4D62B-37C7-4B1D-840A-33D63D1F29C9}"/>
               </a:ext>
             </a:extLst>
           </p:cNvPr>
@@ -21065,11 +20945,112 @@
         </p:nvSpPr>
         <p:spPr>
           <a:xfrm>
-            <a:off x="6473787" y="2983610"/>
-            <a:ext cx="1559344" cy="527065"/>
+            <a:off x="6011171" y="4755467"/>
+            <a:ext cx="1233055" cy="251384"/>
           </a:xfrm>
           <a:prstGeom prst="roundRect">
             <a:avLst/>
+          </a:prstGeom>
+        </p:spPr>
+        <p:style>
+          <a:lnRef idx="2">
+            <a:schemeClr val="accent4">
+              <a:shade val="50000"/>
+            </a:schemeClr>
+          </a:lnRef>
+          <a:fillRef idx="1">
+            <a:schemeClr val="accent4"/>
+          </a:fillRef>
+          <a:effectRef idx="0">
+            <a:schemeClr val="accent4"/>
+          </a:effectRef>
+          <a:fontRef idx="minor">
+            <a:schemeClr val="lt1"/>
+          </a:fontRef>
+        </p:style>
+        <p:txBody>
+          <a:bodyPr rtlCol="0" anchor="ctr"/>
+          <a:lstStyle/>
+          <a:p>
+            <a:pPr algn="ctr"/>
+            <a:r>
+              <a:rPr lang="pt-PT" dirty="0"/>
+              <a:t>Produtos</a:t>
+            </a:r>
+          </a:p>
+        </p:txBody>
+      </p:sp>
+      <p:sp>
+        <p:nvSpPr>
+          <p:cNvPr id="34" name="Retângulo: Cantos Arredondados 33">
+            <a:extLst>
+              <a:ext uri="{FF2B5EF4-FFF2-40B4-BE49-F238E27FC236}">
+                <a16:creationId xmlns:a16="http://schemas.microsoft.com/office/drawing/2014/main" id="{A85C9CD6-062B-4981-8F1F-1CD4F51E2636}"/>
+              </a:ext>
+            </a:extLst>
+          </p:cNvPr>
+          <p:cNvSpPr/>
+          <p:nvPr/>
+        </p:nvSpPr>
+        <p:spPr>
+          <a:xfrm>
+            <a:off x="7439623" y="4740957"/>
+            <a:ext cx="1233055" cy="265894"/>
+          </a:xfrm>
+          <a:prstGeom prst="roundRect">
+            <a:avLst/>
+          </a:prstGeom>
+        </p:spPr>
+        <p:style>
+          <a:lnRef idx="2">
+            <a:schemeClr val="accent4">
+              <a:shade val="50000"/>
+            </a:schemeClr>
+          </a:lnRef>
+          <a:fillRef idx="1">
+            <a:schemeClr val="accent4"/>
+          </a:fillRef>
+          <a:effectRef idx="0">
+            <a:schemeClr val="accent4"/>
+          </a:effectRef>
+          <a:fontRef idx="minor">
+            <a:schemeClr val="lt1"/>
+          </a:fontRef>
+        </p:style>
+        <p:txBody>
+          <a:bodyPr rtlCol="0" anchor="ctr"/>
+          <a:lstStyle/>
+          <a:p>
+            <a:pPr algn="ctr"/>
+            <a:r>
+              <a:rPr lang="pt-PT" dirty="0"/>
+              <a:t>Contactos</a:t>
+            </a:r>
+          </a:p>
+        </p:txBody>
+      </p:sp>
+      <p:sp>
+        <p:nvSpPr>
+          <p:cNvPr id="36" name="Seta: Para a Direita 35">
+            <a:extLst>
+              <a:ext uri="{FF2B5EF4-FFF2-40B4-BE49-F238E27FC236}">
+                <a16:creationId xmlns:a16="http://schemas.microsoft.com/office/drawing/2014/main" id="{A8C088A3-B985-4089-BBD8-DB692084140C}"/>
+              </a:ext>
+            </a:extLst>
+          </p:cNvPr>
+          <p:cNvSpPr/>
+          <p:nvPr/>
+        </p:nvSpPr>
+        <p:spPr>
+          <a:xfrm rot="5400000">
+            <a:off x="5613816" y="3810245"/>
+            <a:ext cx="632503" cy="581736"/>
+          </a:xfrm>
+          <a:prstGeom prst="rightArrow">
+            <a:avLst>
+              <a:gd name="adj1" fmla="val 50000"/>
+              <a:gd name="adj2" fmla="val 48674"/>
+            </a:avLst>
           </a:prstGeom>
         </p:spPr>
         <p:style>
@@ -21093,19 +21074,16 @@
           <a:lstStyle/>
           <a:p>
             <a:pPr algn="ctr"/>
-            <a:r>
-              <a:rPr lang="pt-PT" dirty="0"/>
-              <a:t>Pedidos Restaurantes</a:t>
-            </a:r>
+            <a:endParaRPr lang="pt-PT"/>
           </a:p>
         </p:txBody>
       </p:sp>
       <p:sp>
         <p:nvSpPr>
-          <p:cNvPr id="26" name="Retângulo: Cantos Arredondados 25">
+          <p:cNvPr id="39" name="Retângulo: Cantos Arredondados 38">
             <a:extLst>
               <a:ext uri="{FF2B5EF4-FFF2-40B4-BE49-F238E27FC236}">
-                <a16:creationId xmlns:a16="http://schemas.microsoft.com/office/drawing/2014/main" id="{8B73B402-D10D-4FB5-B0DE-3812322F64E2}"/>
+                <a16:creationId xmlns:a16="http://schemas.microsoft.com/office/drawing/2014/main" id="{2A31346A-B359-4FB2-AD71-B494148947F4}"/>
               </a:ext>
             </a:extLst>
           </p:cNvPr>
@@ -21114,8 +21092,57 @@
         </p:nvSpPr>
         <p:spPr>
           <a:xfrm>
-            <a:off x="6806718" y="3882648"/>
-            <a:ext cx="1233055" cy="300044"/>
+            <a:off x="5429168" y="1310184"/>
+            <a:ext cx="1333664" cy="349573"/>
+          </a:xfrm>
+          <a:prstGeom prst="roundRect">
+            <a:avLst/>
+          </a:prstGeom>
+        </p:spPr>
+        <p:style>
+          <a:lnRef idx="2">
+            <a:schemeClr val="accent6">
+              <a:shade val="50000"/>
+            </a:schemeClr>
+          </a:lnRef>
+          <a:fillRef idx="1">
+            <a:schemeClr val="accent6"/>
+          </a:fillRef>
+          <a:effectRef idx="0">
+            <a:schemeClr val="accent6"/>
+          </a:effectRef>
+          <a:fontRef idx="minor">
+            <a:schemeClr val="lt1"/>
+          </a:fontRef>
+        </p:style>
+        <p:txBody>
+          <a:bodyPr rtlCol="0" anchor="ctr"/>
+          <a:lstStyle/>
+          <a:p>
+            <a:pPr algn="ctr"/>
+            <a:r>
+              <a:rPr lang="pt-PT" dirty="0"/>
+              <a:t>Inicio</a:t>
+            </a:r>
+          </a:p>
+        </p:txBody>
+      </p:sp>
+      <p:sp>
+        <p:nvSpPr>
+          <p:cNvPr id="40" name="Retângulo: Cantos Arredondados 39">
+            <a:extLst>
+              <a:ext uri="{FF2B5EF4-FFF2-40B4-BE49-F238E27FC236}">
+                <a16:creationId xmlns:a16="http://schemas.microsoft.com/office/drawing/2014/main" id="{8952AFE1-218C-4C77-AC34-68B7CE86A080}"/>
+              </a:ext>
+            </a:extLst>
+          </p:cNvPr>
+          <p:cNvSpPr/>
+          <p:nvPr/>
+        </p:nvSpPr>
+        <p:spPr>
+          <a:xfrm>
+            <a:off x="6699895" y="2309248"/>
+            <a:ext cx="1372197" cy="360182"/>
           </a:xfrm>
           <a:prstGeom prst="roundRect">
             <a:avLst/>
@@ -21151,102 +21178,10 @@
       </p:sp>
       <p:sp>
         <p:nvSpPr>
-          <p:cNvPr id="27" name="Seta: Para a Direita 26">
+          <p:cNvPr id="41" name="Retângulo: Cantos Arredondados 40">
             <a:extLst>
               <a:ext uri="{FF2B5EF4-FFF2-40B4-BE49-F238E27FC236}">
-                <a16:creationId xmlns:a16="http://schemas.microsoft.com/office/drawing/2014/main" id="{4CDA7023-6133-4D65-B0A7-C8D4A659C407}"/>
-              </a:ext>
-            </a:extLst>
-          </p:cNvPr>
-          <p:cNvSpPr/>
-          <p:nvPr/>
-        </p:nvSpPr>
-        <p:spPr>
-          <a:xfrm rot="19283127">
-            <a:off x="4610913" y="1921326"/>
-            <a:ext cx="1960587" cy="396284"/>
-          </a:xfrm>
-          <a:prstGeom prst="rightArrow">
-            <a:avLst/>
-          </a:prstGeom>
-        </p:spPr>
-        <p:style>
-          <a:lnRef idx="2">
-            <a:schemeClr val="accent1">
-              <a:shade val="50000"/>
-            </a:schemeClr>
-          </a:lnRef>
-          <a:fillRef idx="1">
-            <a:schemeClr val="accent1"/>
-          </a:fillRef>
-          <a:effectRef idx="0">
-            <a:schemeClr val="accent1"/>
-          </a:effectRef>
-          <a:fontRef idx="minor">
-            <a:schemeClr val="lt1"/>
-          </a:fontRef>
-        </p:style>
-        <p:txBody>
-          <a:bodyPr rtlCol="0" anchor="ctr"/>
-          <a:lstStyle/>
-          <a:p>
-            <a:pPr algn="ctr"/>
-            <a:endParaRPr lang="pt-PT"/>
-          </a:p>
-        </p:txBody>
-      </p:sp>
-      <p:sp>
-        <p:nvSpPr>
-          <p:cNvPr id="28" name="Seta: Para a Direita 27">
-            <a:extLst>
-              <a:ext uri="{FF2B5EF4-FFF2-40B4-BE49-F238E27FC236}">
-                <a16:creationId xmlns:a16="http://schemas.microsoft.com/office/drawing/2014/main" id="{38D8513E-9C7D-496E-907E-3D89858BB635}"/>
-              </a:ext>
-            </a:extLst>
-          </p:cNvPr>
-          <p:cNvSpPr/>
-          <p:nvPr/>
-        </p:nvSpPr>
-        <p:spPr>
-          <a:xfrm rot="19893008">
-            <a:off x="5167669" y="2370502"/>
-            <a:ext cx="1427986" cy="396284"/>
-          </a:xfrm>
-          <a:prstGeom prst="rightArrow">
-            <a:avLst/>
-          </a:prstGeom>
-        </p:spPr>
-        <p:style>
-          <a:lnRef idx="2">
-            <a:schemeClr val="accent1">
-              <a:shade val="50000"/>
-            </a:schemeClr>
-          </a:lnRef>
-          <a:fillRef idx="1">
-            <a:schemeClr val="accent1"/>
-          </a:fillRef>
-          <a:effectRef idx="0">
-            <a:schemeClr val="accent1"/>
-          </a:effectRef>
-          <a:fontRef idx="minor">
-            <a:schemeClr val="lt1"/>
-          </a:fontRef>
-        </p:style>
-        <p:txBody>
-          <a:bodyPr rtlCol="0" anchor="ctr"/>
-          <a:lstStyle/>
-          <a:p>
-            <a:pPr algn="ctr"/>
-            <a:endParaRPr lang="pt-PT"/>
-          </a:p>
-        </p:txBody>
-      </p:sp>
-      <p:sp>
-        <p:nvSpPr>
-          <p:cNvPr id="29" name="Seta: Para a Direita 28">
-            <a:extLst>
-              <a:ext uri="{FF2B5EF4-FFF2-40B4-BE49-F238E27FC236}">
-                <a16:creationId xmlns:a16="http://schemas.microsoft.com/office/drawing/2014/main" id="{34E30793-E8F9-458C-BDAC-9F825830DB92}"/>
+                <a16:creationId xmlns:a16="http://schemas.microsoft.com/office/drawing/2014/main" id="{F8E3ADE5-B711-464E-ABEC-6C33796535E1}"/>
               </a:ext>
             </a:extLst>
           </p:cNvPr>
@@ -21255,100 +21190,8 @@
         </p:nvSpPr>
         <p:spPr>
           <a:xfrm>
-            <a:off x="5246254" y="3059485"/>
-            <a:ext cx="1227358" cy="396284"/>
-          </a:xfrm>
-          <a:prstGeom prst="rightArrow">
-            <a:avLst/>
-          </a:prstGeom>
-        </p:spPr>
-        <p:style>
-          <a:lnRef idx="2">
-            <a:schemeClr val="accent1">
-              <a:shade val="50000"/>
-            </a:schemeClr>
-          </a:lnRef>
-          <a:fillRef idx="1">
-            <a:schemeClr val="accent1"/>
-          </a:fillRef>
-          <a:effectRef idx="0">
-            <a:schemeClr val="accent1"/>
-          </a:effectRef>
-          <a:fontRef idx="minor">
-            <a:schemeClr val="lt1"/>
-          </a:fontRef>
-        </p:style>
-        <p:txBody>
-          <a:bodyPr rtlCol="0" anchor="ctr"/>
-          <a:lstStyle/>
-          <a:p>
-            <a:pPr algn="ctr"/>
-            <a:endParaRPr lang="pt-PT"/>
-          </a:p>
-        </p:txBody>
-      </p:sp>
-      <p:sp>
-        <p:nvSpPr>
-          <p:cNvPr id="30" name="Seta: Para a Direita 29">
-            <a:extLst>
-              <a:ext uri="{FF2B5EF4-FFF2-40B4-BE49-F238E27FC236}">
-                <a16:creationId xmlns:a16="http://schemas.microsoft.com/office/drawing/2014/main" id="{05D38B35-D032-45C3-95B6-0AB24896F51B}"/>
-              </a:ext>
-            </a:extLst>
-          </p:cNvPr>
-          <p:cNvSpPr/>
-          <p:nvPr/>
-        </p:nvSpPr>
-        <p:spPr>
-          <a:xfrm rot="1049582">
-            <a:off x="5215394" y="3605449"/>
-            <a:ext cx="1575250" cy="396284"/>
-          </a:xfrm>
-          <a:prstGeom prst="rightArrow">
-            <a:avLst/>
-          </a:prstGeom>
-        </p:spPr>
-        <p:style>
-          <a:lnRef idx="2">
-            <a:schemeClr val="accent1">
-              <a:shade val="50000"/>
-            </a:schemeClr>
-          </a:lnRef>
-          <a:fillRef idx="1">
-            <a:schemeClr val="accent1"/>
-          </a:fillRef>
-          <a:effectRef idx="0">
-            <a:schemeClr val="accent1"/>
-          </a:effectRef>
-          <a:fontRef idx="minor">
-            <a:schemeClr val="lt1"/>
-          </a:fontRef>
-        </p:style>
-        <p:txBody>
-          <a:bodyPr rtlCol="0" anchor="ctr"/>
-          <a:lstStyle/>
-          <a:p>
-            <a:pPr algn="ctr"/>
-            <a:endParaRPr lang="pt-PT"/>
-          </a:p>
-        </p:txBody>
-      </p:sp>
-      <p:sp>
-        <p:nvSpPr>
-          <p:cNvPr id="31" name="Retângulo: Cantos Arredondados 30">
-            <a:extLst>
-              <a:ext uri="{FF2B5EF4-FFF2-40B4-BE49-F238E27FC236}">
-                <a16:creationId xmlns:a16="http://schemas.microsoft.com/office/drawing/2014/main" id="{26D9402C-265A-44C8-98D0-87544C04C2BC}"/>
-              </a:ext>
-            </a:extLst>
-          </p:cNvPr>
-          <p:cNvSpPr/>
-          <p:nvPr/>
-        </p:nvSpPr>
-        <p:spPr>
-          <a:xfrm>
-            <a:off x="6371929" y="1233928"/>
-            <a:ext cx="712192" cy="300044"/>
+            <a:off x="5321162" y="2310725"/>
+            <a:ext cx="1227358" cy="357228"/>
           </a:xfrm>
           <a:prstGeom prst="roundRect">
             <a:avLst/>
@@ -21377,17 +21220,17 @@
             <a:pPr algn="ctr"/>
             <a:r>
               <a:rPr lang="pt-PT" dirty="0"/>
-              <a:t>Perfil</a:t>
+              <a:t>Login</a:t>
             </a:r>
           </a:p>
         </p:txBody>
       </p:sp>
       <p:sp>
         <p:nvSpPr>
-          <p:cNvPr id="32" name="Retângulo: Cantos Arredondados 31">
+          <p:cNvPr id="42" name="Retângulo: Cantos Arredondados 41">
             <a:extLst>
               <a:ext uri="{FF2B5EF4-FFF2-40B4-BE49-F238E27FC236}">
-                <a16:creationId xmlns:a16="http://schemas.microsoft.com/office/drawing/2014/main" id="{B8A4D62B-37C7-4B1D-840A-33D63D1F29C9}"/>
+                <a16:creationId xmlns:a16="http://schemas.microsoft.com/office/drawing/2014/main" id="{36C8398F-8B05-4E56-84B9-61982276CD74}"/>
               </a:ext>
             </a:extLst>
           </p:cNvPr>
@@ -21396,8 +21239,114 @@
         </p:nvSpPr>
         <p:spPr>
           <a:xfrm>
-            <a:off x="7648375" y="5097987"/>
-            <a:ext cx="1109087" cy="525791"/>
+            <a:off x="4605554" y="4755467"/>
+            <a:ext cx="1210220" cy="251384"/>
+          </a:xfrm>
+          <a:prstGeom prst="roundRect">
+            <a:avLst/>
+          </a:prstGeom>
+        </p:spPr>
+        <p:style>
+          <a:lnRef idx="2">
+            <a:schemeClr val="accent4">
+              <a:shade val="50000"/>
+            </a:schemeClr>
+          </a:lnRef>
+          <a:fillRef idx="1">
+            <a:schemeClr val="accent4"/>
+          </a:fillRef>
+          <a:effectRef idx="0">
+            <a:schemeClr val="accent4"/>
+          </a:effectRef>
+          <a:fontRef idx="minor">
+            <a:schemeClr val="lt1"/>
+          </a:fontRef>
+        </p:style>
+        <p:txBody>
+          <a:bodyPr rtlCol="0" anchor="ctr"/>
+          <a:lstStyle/>
+          <a:p>
+            <a:pPr algn="ctr"/>
+            <a:r>
+              <a:rPr lang="pt-PT" dirty="0"/>
+              <a:t>Pedidos</a:t>
+            </a:r>
+          </a:p>
+        </p:txBody>
+      </p:sp>
+      <p:sp>
+        <p:nvSpPr>
+          <p:cNvPr id="43" name="Retângulo: Cantos Arredondados 42">
+            <a:extLst>
+              <a:ext uri="{FF2B5EF4-FFF2-40B4-BE49-F238E27FC236}">
+                <a16:creationId xmlns:a16="http://schemas.microsoft.com/office/drawing/2014/main" id="{7A354D0B-5EB1-4B0C-ABF3-3E961D467515}"/>
+              </a:ext>
+            </a:extLst>
+          </p:cNvPr>
+          <p:cNvSpPr/>
+          <p:nvPr/>
+        </p:nvSpPr>
+        <p:spPr>
+          <a:xfrm>
+            <a:off x="3775217" y="5521819"/>
+            <a:ext cx="1210221" cy="250598"/>
+          </a:xfrm>
+          <a:prstGeom prst="roundRect">
+            <a:avLst/>
+          </a:prstGeom>
+          <a:solidFill>
+            <a:srgbClr val="92D050"/>
+          </a:solidFill>
+          <a:ln>
+            <a:solidFill>
+              <a:srgbClr val="92D050"/>
+            </a:solidFill>
+          </a:ln>
+        </p:spPr>
+        <p:style>
+          <a:lnRef idx="2">
+            <a:schemeClr val="accent1">
+              <a:shade val="50000"/>
+            </a:schemeClr>
+          </a:lnRef>
+          <a:fillRef idx="1">
+            <a:schemeClr val="accent1"/>
+          </a:fillRef>
+          <a:effectRef idx="0">
+            <a:schemeClr val="accent1"/>
+          </a:effectRef>
+          <a:fontRef idx="minor">
+            <a:schemeClr val="lt1"/>
+          </a:fontRef>
+        </p:style>
+        <p:txBody>
+          <a:bodyPr rtlCol="0" anchor="ctr"/>
+          <a:lstStyle/>
+          <a:p>
+            <a:pPr algn="ctr"/>
+            <a:r>
+              <a:rPr lang="pt-PT" dirty="0"/>
+              <a:t>Takeaway</a:t>
+            </a:r>
+          </a:p>
+        </p:txBody>
+      </p:sp>
+      <p:sp>
+        <p:nvSpPr>
+          <p:cNvPr id="44" name="Retângulo: Cantos Arredondados 43">
+            <a:extLst>
+              <a:ext uri="{FF2B5EF4-FFF2-40B4-BE49-F238E27FC236}">
+                <a16:creationId xmlns:a16="http://schemas.microsoft.com/office/drawing/2014/main" id="{4EAD56DC-69B8-449B-B4AF-2B0024E8A57F}"/>
+              </a:ext>
+            </a:extLst>
+          </p:cNvPr>
+          <p:cNvSpPr/>
+          <p:nvPr/>
+        </p:nvSpPr>
+        <p:spPr>
+          <a:xfrm>
+            <a:off x="8192442" y="2321578"/>
+            <a:ext cx="1227358" cy="357228"/>
           </a:xfrm>
           <a:prstGeom prst="roundRect">
             <a:avLst/>
@@ -21426,17 +21375,17 @@
             <a:pPr algn="ctr"/>
             <a:r>
               <a:rPr lang="pt-PT" dirty="0"/>
-              <a:t>Produtos</a:t>
+              <a:t>Registar</a:t>
             </a:r>
           </a:p>
         </p:txBody>
       </p:sp>
       <p:sp>
         <p:nvSpPr>
-          <p:cNvPr id="33" name="Retângulo: Cantos Arredondados 32">
+          <p:cNvPr id="45" name="Retângulo: Cantos Arredondados 44">
             <a:extLst>
               <a:ext uri="{FF2B5EF4-FFF2-40B4-BE49-F238E27FC236}">
-                <a16:creationId xmlns:a16="http://schemas.microsoft.com/office/drawing/2014/main" id="{B891FB33-1828-4A4F-A6A6-4B79F3F0239D}"/>
+                <a16:creationId xmlns:a16="http://schemas.microsoft.com/office/drawing/2014/main" id="{2DAE48ED-D585-4574-8462-50526A994A92}"/>
               </a:ext>
             </a:extLst>
           </p:cNvPr>
@@ -21445,8 +21394,8 @@
         </p:nvSpPr>
         <p:spPr>
           <a:xfrm>
-            <a:off x="7423246" y="5730038"/>
-            <a:ext cx="1559344" cy="527065"/>
+            <a:off x="2263567" y="2335342"/>
+            <a:ext cx="1568882" cy="357228"/>
           </a:xfrm>
           <a:prstGeom prst="roundRect">
             <a:avLst/>
@@ -21475,17 +21424,63 @@
             <a:pPr algn="ctr"/>
             <a:r>
               <a:rPr lang="pt-PT" dirty="0"/>
-              <a:t>Pedidos Takeaway</a:t>
+              <a:t>Configurações</a:t>
             </a:r>
           </a:p>
         </p:txBody>
       </p:sp>
       <p:sp>
         <p:nvSpPr>
-          <p:cNvPr id="34" name="Retângulo: Cantos Arredondados 33">
+          <p:cNvPr id="48" name="Seta: Para a Direita 47">
             <a:extLst>
               <a:ext uri="{FF2B5EF4-FFF2-40B4-BE49-F238E27FC236}">
-                <a16:creationId xmlns:a16="http://schemas.microsoft.com/office/drawing/2014/main" id="{A85C9CD6-062B-4981-8F1F-1CD4F51E2636}"/>
+                <a16:creationId xmlns:a16="http://schemas.microsoft.com/office/drawing/2014/main" id="{C2653241-52B4-477C-A7FA-B7DCCDE63576}"/>
+              </a:ext>
+            </a:extLst>
+          </p:cNvPr>
+          <p:cNvSpPr/>
+          <p:nvPr/>
+        </p:nvSpPr>
+        <p:spPr>
+          <a:xfrm rot="5400000">
+            <a:off x="6187763" y="2810342"/>
+            <a:ext cx="457870" cy="263642"/>
+          </a:xfrm>
+          <a:prstGeom prst="rightArrow">
+            <a:avLst/>
+          </a:prstGeom>
+        </p:spPr>
+        <p:style>
+          <a:lnRef idx="2">
+            <a:schemeClr val="accent2">
+              <a:shade val="50000"/>
+            </a:schemeClr>
+          </a:lnRef>
+          <a:fillRef idx="1">
+            <a:schemeClr val="accent2"/>
+          </a:fillRef>
+          <a:effectRef idx="0">
+            <a:schemeClr val="accent2"/>
+          </a:effectRef>
+          <a:fontRef idx="minor">
+            <a:schemeClr val="lt1"/>
+          </a:fontRef>
+        </p:style>
+        <p:txBody>
+          <a:bodyPr rtlCol="0" anchor="ctr"/>
+          <a:lstStyle/>
+          <a:p>
+            <a:pPr algn="ctr"/>
+            <a:endParaRPr lang="pt-PT"/>
+          </a:p>
+        </p:txBody>
+      </p:sp>
+      <p:sp>
+        <p:nvSpPr>
+          <p:cNvPr id="49" name="Retângulo: Cantos Arredondados 48">
+            <a:extLst>
+              <a:ext uri="{FF2B5EF4-FFF2-40B4-BE49-F238E27FC236}">
+                <a16:creationId xmlns:a16="http://schemas.microsoft.com/office/drawing/2014/main" id="{4D3F3890-16B5-4C0E-A429-B1BB8AE87AFA}"/>
               </a:ext>
             </a:extLst>
           </p:cNvPr>
@@ -21494,12 +21489,20 @@
         </p:nvSpPr>
         <p:spPr>
           <a:xfrm>
-            <a:off x="7561491" y="6421431"/>
-            <a:ext cx="1233055" cy="300044"/>
+            <a:off x="5319017" y="5521819"/>
+            <a:ext cx="1556355" cy="250598"/>
           </a:xfrm>
           <a:prstGeom prst="roundRect">
             <a:avLst/>
           </a:prstGeom>
+          <a:solidFill>
+            <a:srgbClr val="00B0F0"/>
+          </a:solidFill>
+          <a:ln>
+            <a:solidFill>
+              <a:srgbClr val="00B0F0"/>
+            </a:solidFill>
+          </a:ln>
         </p:spPr>
         <p:style>
           <a:lnRef idx="2">
@@ -21524,17 +21527,17 @@
             <a:pPr algn="ctr"/>
             <a:r>
               <a:rPr lang="pt-PT" dirty="0"/>
-              <a:t>Contactos</a:t>
+              <a:t>Restaurante</a:t>
             </a:r>
           </a:p>
         </p:txBody>
       </p:sp>
       <p:sp>
         <p:nvSpPr>
-          <p:cNvPr id="35" name="Seta: Para a Direita 34">
+          <p:cNvPr id="51" name="Seta: Para a Direita 50">
             <a:extLst>
               <a:ext uri="{FF2B5EF4-FFF2-40B4-BE49-F238E27FC236}">
-                <a16:creationId xmlns:a16="http://schemas.microsoft.com/office/drawing/2014/main" id="{76919C71-0E7B-4BE1-BD2B-84FD19422FBD}"/>
+                <a16:creationId xmlns:a16="http://schemas.microsoft.com/office/drawing/2014/main" id="{489AEF14-E4D5-4A84-8EF5-289B2CBC681A}"/>
               </a:ext>
             </a:extLst>
           </p:cNvPr>
@@ -21542,9 +21545,9 @@
           <p:nvPr/>
         </p:nvSpPr>
         <p:spPr>
-          <a:xfrm rot="21011947">
-            <a:off x="5172502" y="4755874"/>
-            <a:ext cx="2680589" cy="382590"/>
+          <a:xfrm rot="5400000">
+            <a:off x="5447225" y="5126717"/>
+            <a:ext cx="324640" cy="239900"/>
           </a:xfrm>
           <a:prstGeom prst="rightArrow">
             <a:avLst/>
@@ -21552,15 +21555,15 @@
         </p:spPr>
         <p:style>
           <a:lnRef idx="2">
-            <a:schemeClr val="accent1">
+            <a:schemeClr val="accent2">
               <a:shade val="50000"/>
             </a:schemeClr>
           </a:lnRef>
           <a:fillRef idx="1">
-            <a:schemeClr val="accent1"/>
+            <a:schemeClr val="accent2"/>
           </a:fillRef>
           <a:effectRef idx="0">
-            <a:schemeClr val="accent1"/>
+            <a:schemeClr val="accent2"/>
           </a:effectRef>
           <a:fontRef idx="minor">
             <a:schemeClr val="lt1"/>
@@ -21577,10 +21580,10 @@
       </p:sp>
       <p:sp>
         <p:nvSpPr>
-          <p:cNvPr id="36" name="Seta: Para a Direita 35">
+          <p:cNvPr id="52" name="Seta: Para a Direita 51">
             <a:extLst>
               <a:ext uri="{FF2B5EF4-FFF2-40B4-BE49-F238E27FC236}">
-                <a16:creationId xmlns:a16="http://schemas.microsoft.com/office/drawing/2014/main" id="{A8C088A3-B985-4089-BBD8-DB692084140C}"/>
+                <a16:creationId xmlns:a16="http://schemas.microsoft.com/office/drawing/2014/main" id="{15D36C2C-E3BD-4E7A-AD59-E6194B40AD30}"/>
               </a:ext>
             </a:extLst>
           </p:cNvPr>
@@ -21588,9 +21591,9 @@
           <p:nvPr/>
         </p:nvSpPr>
         <p:spPr>
-          <a:xfrm rot="21299892">
-            <a:off x="5288673" y="5202288"/>
-            <a:ext cx="2358198" cy="382590"/>
+          <a:xfrm rot="5400000">
+            <a:off x="4694721" y="5150630"/>
+            <a:ext cx="324640" cy="239900"/>
           </a:xfrm>
           <a:prstGeom prst="rightArrow">
             <a:avLst/>
@@ -21598,107 +21601,15 @@
         </p:spPr>
         <p:style>
           <a:lnRef idx="2">
-            <a:schemeClr val="accent1">
+            <a:schemeClr val="accent2">
               <a:shade val="50000"/>
             </a:schemeClr>
           </a:lnRef>
           <a:fillRef idx="1">
-            <a:schemeClr val="accent1"/>
+            <a:schemeClr val="accent2"/>
           </a:fillRef>
           <a:effectRef idx="0">
-            <a:schemeClr val="accent1"/>
-          </a:effectRef>
-          <a:fontRef idx="minor">
-            <a:schemeClr val="lt1"/>
-          </a:fontRef>
-        </p:style>
-        <p:txBody>
-          <a:bodyPr rtlCol="0" anchor="ctr"/>
-          <a:lstStyle/>
-          <a:p>
-            <a:pPr algn="ctr"/>
-            <a:endParaRPr lang="pt-PT"/>
-          </a:p>
-        </p:txBody>
-      </p:sp>
-      <p:sp>
-        <p:nvSpPr>
-          <p:cNvPr id="37" name="Seta: Para a Direita 36">
-            <a:extLst>
-              <a:ext uri="{FF2B5EF4-FFF2-40B4-BE49-F238E27FC236}">
-                <a16:creationId xmlns:a16="http://schemas.microsoft.com/office/drawing/2014/main" id="{F6419513-4349-4403-AD51-6CA1EC4E873D}"/>
-              </a:ext>
-            </a:extLst>
-          </p:cNvPr>
-          <p:cNvSpPr/>
-          <p:nvPr/>
-        </p:nvSpPr>
-        <p:spPr>
-          <a:xfrm rot="427396">
-            <a:off x="5266188" y="5686621"/>
-            <a:ext cx="2104205" cy="382590"/>
-          </a:xfrm>
-          <a:prstGeom prst="rightArrow">
-            <a:avLst/>
-          </a:prstGeom>
-        </p:spPr>
-        <p:style>
-          <a:lnRef idx="2">
-            <a:schemeClr val="accent1">
-              <a:shade val="50000"/>
-            </a:schemeClr>
-          </a:lnRef>
-          <a:fillRef idx="1">
-            <a:schemeClr val="accent1"/>
-          </a:fillRef>
-          <a:effectRef idx="0">
-            <a:schemeClr val="accent1"/>
-          </a:effectRef>
-          <a:fontRef idx="minor">
-            <a:schemeClr val="lt1"/>
-          </a:fontRef>
-        </p:style>
-        <p:txBody>
-          <a:bodyPr rtlCol="0" anchor="ctr"/>
-          <a:lstStyle/>
-          <a:p>
-            <a:pPr algn="ctr"/>
-            <a:endParaRPr lang="pt-PT"/>
-          </a:p>
-        </p:txBody>
-      </p:sp>
-      <p:sp>
-        <p:nvSpPr>
-          <p:cNvPr id="38" name="Seta: Para a Direita 37">
-            <a:extLst>
-              <a:ext uri="{FF2B5EF4-FFF2-40B4-BE49-F238E27FC236}">
-                <a16:creationId xmlns:a16="http://schemas.microsoft.com/office/drawing/2014/main" id="{CE11BE1D-08E9-46C6-B27B-73085B5ED133}"/>
-              </a:ext>
-            </a:extLst>
-          </p:cNvPr>
-          <p:cNvSpPr/>
-          <p:nvPr/>
-        </p:nvSpPr>
-        <p:spPr>
-          <a:xfrm rot="699377">
-            <a:off x="5085749" y="6114751"/>
-            <a:ext cx="2474286" cy="382590"/>
-          </a:xfrm>
-          <a:prstGeom prst="rightArrow">
-            <a:avLst/>
-          </a:prstGeom>
-        </p:spPr>
-        <p:style>
-          <a:lnRef idx="2">
-            <a:schemeClr val="accent1">
-              <a:shade val="50000"/>
-            </a:schemeClr>
-          </a:lnRef>
-          <a:fillRef idx="1">
-            <a:schemeClr val="accent1"/>
-          </a:fillRef>
-          <a:effectRef idx="0">
-            <a:schemeClr val="accent1"/>
+            <a:schemeClr val="accent2"/>
           </a:effectRef>
           <a:fontRef idx="minor">
             <a:schemeClr val="lt1"/>

</xml_diff>